<commit_message>
Fixed build errors from switching to TypeScript 0.9.1. Updated presentation with new keywords
</commit_message>
<xml_diff>
--- a/typescript/TypeScript - Beyond JavaScript.pptx
+++ b/typescript/TypeScript - Beyond JavaScript.pptx
@@ -128,7 +128,7 @@
   </p:defaultTextStyle>
   <p:extLst>
     <p:ext uri="{EFAFB233-063F-42B5-8137-9DF3F51BA10A}">
-      <p15:sldGuideLst xmlns:p15="http://schemas.microsoft.com/office/powerpoint/2012/main" xmlns="">
+      <p15:sldGuideLst xmlns="" xmlns:p15="http://schemas.microsoft.com/office/powerpoint/2012/main">
         <p15:guide id="1" orient="horz" pos="2160" userDrawn="1">
           <p15:clr>
             <a:srgbClr val="A4A3A4"/>
@@ -371,7 +371,7 @@
           <a:p>
             <a:fld id="{96DFF08F-DC6B-4601-B491-B0F83F6DD2DA}" type="datetimeFigureOut">
               <a:rPr lang="en-US" smtClean="0"/>
-              <a:t>10/23/2013</a:t>
+              <a:t>10/24/2013</a:t>
             </a:fld>
             <a:endParaRPr lang="en-US" dirty="0"/>
           </a:p>
@@ -579,7 +579,7 @@
           <a:p>
             <a:fld id="{96DFF08F-DC6B-4601-B491-B0F83F6DD2DA}" type="datetimeFigureOut">
               <a:rPr lang="en-US" smtClean="0"/>
-              <a:t>10/23/2013</a:t>
+              <a:t>10/24/2013</a:t>
             </a:fld>
             <a:endParaRPr lang="en-US" dirty="0"/>
           </a:p>
@@ -835,7 +835,7 @@
           <a:p>
             <a:fld id="{96DFF08F-DC6B-4601-B491-B0F83F6DD2DA}" type="datetimeFigureOut">
               <a:rPr lang="en-US" smtClean="0"/>
-              <a:t>10/23/2013</a:t>
+              <a:t>10/24/2013</a:t>
             </a:fld>
             <a:endParaRPr lang="en-US" dirty="0"/>
           </a:p>
@@ -1005,7 +1005,7 @@
           <a:p>
             <a:fld id="{D62CEF3B-A037-46D0-B02C-1428F07E9383}" type="datetimeFigureOut">
               <a:rPr lang="en-US" smtClean="0"/>
-              <a:t>10/23/2013</a:t>
+              <a:t>10/24/2013</a:t>
             </a:fld>
             <a:endParaRPr lang="en-US" dirty="0"/>
           </a:p>
@@ -1348,7 +1348,7 @@
           <a:p>
             <a:fld id="{96DFF08F-DC6B-4601-B491-B0F83F6DD2DA}" type="datetimeFigureOut">
               <a:rPr lang="en-US" smtClean="0"/>
-              <a:t>10/23/2013</a:t>
+              <a:t>10/24/2013</a:t>
             </a:fld>
             <a:endParaRPr lang="en-US" dirty="0"/>
           </a:p>
@@ -1623,7 +1623,7 @@
           <a:p>
             <a:fld id="{96DFF08F-DC6B-4601-B491-B0F83F6DD2DA}" type="datetimeFigureOut">
               <a:rPr lang="en-US" smtClean="0"/>
-              <a:t>10/23/2013</a:t>
+              <a:t>10/24/2013</a:t>
             </a:fld>
             <a:endParaRPr lang="en-US" dirty="0"/>
           </a:p>
@@ -2002,7 +2002,7 @@
           <a:p>
             <a:fld id="{96DFF08F-DC6B-4601-B491-B0F83F6DD2DA}" type="datetimeFigureOut">
               <a:rPr lang="en-US" smtClean="0"/>
-              <a:t>10/23/2013</a:t>
+              <a:t>10/24/2013</a:t>
             </a:fld>
             <a:endParaRPr lang="en-US" dirty="0"/>
           </a:p>
@@ -2120,7 +2120,7 @@
           <a:p>
             <a:fld id="{96DFF08F-DC6B-4601-B491-B0F83F6DD2DA}" type="datetimeFigureOut">
               <a:rPr lang="en-US" smtClean="0"/>
-              <a:t>10/23/2013</a:t>
+              <a:t>10/24/2013</a:t>
             </a:fld>
             <a:endParaRPr lang="en-US" dirty="0"/>
           </a:p>
@@ -2292,7 +2292,7 @@
             <a:fld id="{96DFF08F-DC6B-4601-B491-B0F83F6DD2DA}" type="datetimeFigureOut">
               <a:rPr lang="en-US" smtClean="0"/>
               <a:pPr/>
-              <a:t>10/23/2013</a:t>
+              <a:t>10/24/2013</a:t>
             </a:fld>
             <a:endParaRPr lang="en-US" dirty="0"/>
           </a:p>
@@ -2648,7 +2648,7 @@
             <a:fld id="{96DFF08F-DC6B-4601-B491-B0F83F6DD2DA}" type="datetimeFigureOut">
               <a:rPr lang="en-US" smtClean="0"/>
               <a:pPr/>
-              <a:t>10/23/2013</a:t>
+              <a:t>10/24/2013</a:t>
             </a:fld>
             <a:endParaRPr lang="en-US" dirty="0"/>
           </a:p>
@@ -3026,7 +3026,7 @@
           <a:p>
             <a:fld id="{96DFF08F-DC6B-4601-B491-B0F83F6DD2DA}" type="datetimeFigureOut">
               <a:rPr lang="en-US" smtClean="0"/>
-              <a:t>10/23/2013</a:t>
+              <a:t>10/24/2013</a:t>
             </a:fld>
             <a:endParaRPr lang="en-US" dirty="0"/>
           </a:p>
@@ -3314,7 +3314,7 @@
             <a:fld id="{96DFF08F-DC6B-4601-B491-B0F83F6DD2DA}" type="datetimeFigureOut">
               <a:rPr lang="en-US" smtClean="0"/>
               <a:pPr/>
-              <a:t>10/23/2013</a:t>
+              <a:t>10/24/2013</a:t>
             </a:fld>
             <a:endParaRPr lang="en-US" dirty="0"/>
           </a:p>
@@ -5570,9 +5570,14 @@
               <a:buChar char="§"/>
             </a:pPr>
             <a:r>
-              <a:rPr lang="en-US" dirty="0" smtClean="0"/>
-              <a:t>module</a:t>
-            </a:r>
+              <a:rPr lang="en-US" strike="sngStrike" smtClean="0"/>
+              <a:t>module </a:t>
+            </a:r>
+            <a:r>
+              <a:rPr lang="en-US" smtClean="0"/>
+              <a:t>  require</a:t>
+            </a:r>
+            <a:endParaRPr lang="en-US" strike="sngStrike" dirty="0" smtClean="0"/>
           </a:p>
           <a:p>
             <a:pPr>
@@ -11122,15 +11127,7 @@
             </a:pPr>
             <a:r>
               <a:rPr lang="en-US" dirty="0" smtClean="0"/>
-              <a:t>It’s </a:t>
-            </a:r>
-            <a:r>
-              <a:rPr lang="en-US" dirty="0" smtClean="0"/>
-              <a:t>in </a:t>
-            </a:r>
-            <a:r>
-              <a:rPr lang="en-US" dirty="0" smtClean="0"/>
-              <a:t>a presentation that I’m giving</a:t>
+              <a:t>It’s in a presentation that I’m giving</a:t>
             </a:r>
             <a:endParaRPr lang="en-US" dirty="0"/>
           </a:p>
@@ -11900,7 +11897,7 @@
   <a:extraClrSchemeLst/>
   <a:extLst>
     <a:ext uri="{05A4C25C-085E-4340-85A3-A5531E510DB2}">
-      <thm15:themeFamily xmlns:thm15="http://schemas.microsoft.com/office/thememl/2012/main" xmlns="" name="Retrospect" id="{5F128B03-DCCA-4EEB-AB3B-CF2899314A46}" vid="{9CC26709-368C-4D72-9060-94E5B3FF3CD6}"/>
+      <thm15:themeFamily xmlns="" xmlns:thm15="http://schemas.microsoft.com/office/thememl/2012/main" name="Retrospect" id="{5F128B03-DCCA-4EEB-AB3B-CF2899314A46}" vid="{9CC26709-368C-4D72-9060-94E5B3FF3CD6}"/>
     </a:ext>
   </a:extLst>
 </a:theme>

</xml_diff>

<commit_message>
Updates to TypeScript demo for STLDODN
</commit_message>
<xml_diff>
--- a/typescript/TypeScript - Beyond JavaScript.pptx
+++ b/typescript/TypeScript - Beyond JavaScript.pptx
@@ -17,17 +17,18 @@
     <p:sldId id="273" r:id="rId11"/>
     <p:sldId id="263" r:id="rId12"/>
     <p:sldId id="264" r:id="rId13"/>
-    <p:sldId id="267" r:id="rId14"/>
-    <p:sldId id="265" r:id="rId15"/>
-    <p:sldId id="266" r:id="rId16"/>
-    <p:sldId id="268" r:id="rId17"/>
-    <p:sldId id="288" r:id="rId18"/>
-    <p:sldId id="292" r:id="rId19"/>
-    <p:sldId id="270" r:id="rId20"/>
-    <p:sldId id="271" r:id="rId21"/>
-    <p:sldId id="280" r:id="rId22"/>
-    <p:sldId id="290" r:id="rId23"/>
-    <p:sldId id="289" r:id="rId24"/>
+    <p:sldId id="293" r:id="rId14"/>
+    <p:sldId id="267" r:id="rId15"/>
+    <p:sldId id="265" r:id="rId16"/>
+    <p:sldId id="266" r:id="rId17"/>
+    <p:sldId id="268" r:id="rId18"/>
+    <p:sldId id="288" r:id="rId19"/>
+    <p:sldId id="292" r:id="rId20"/>
+    <p:sldId id="270" r:id="rId21"/>
+    <p:sldId id="271" r:id="rId22"/>
+    <p:sldId id="280" r:id="rId23"/>
+    <p:sldId id="290" r:id="rId24"/>
+    <p:sldId id="289" r:id="rId25"/>
   </p:sldIdLst>
   <p:sldSz cx="9144000" cy="6858000" type="screen4x3"/>
   <p:notesSz cx="6858000" cy="9144000"/>
@@ -128,7 +129,7 @@
   </p:defaultTextStyle>
   <p:extLst>
     <p:ext uri="{EFAFB233-063F-42B5-8137-9DF3F51BA10A}">
-      <p15:sldGuideLst xmlns="" xmlns:p15="http://schemas.microsoft.com/office/powerpoint/2012/main">
+      <p15:sldGuideLst xmlns:p15="http://schemas.microsoft.com/office/powerpoint/2012/main" xmlns="">
         <p15:guide id="1" orient="horz" pos="2160" userDrawn="1">
           <p15:clr>
             <a:srgbClr val="A4A3A4"/>
@@ -371,7 +372,7 @@
           <a:p>
             <a:fld id="{96DFF08F-DC6B-4601-B491-B0F83F6DD2DA}" type="datetimeFigureOut">
               <a:rPr lang="en-US" smtClean="0"/>
-              <a:t>10/24/2013</a:t>
+              <a:t>11/3/2014</a:t>
             </a:fld>
             <a:endParaRPr lang="en-US" dirty="0"/>
           </a:p>
@@ -579,7 +580,7 @@
           <a:p>
             <a:fld id="{96DFF08F-DC6B-4601-B491-B0F83F6DD2DA}" type="datetimeFigureOut">
               <a:rPr lang="en-US" smtClean="0"/>
-              <a:t>10/24/2013</a:t>
+              <a:t>11/3/2014</a:t>
             </a:fld>
             <a:endParaRPr lang="en-US" dirty="0"/>
           </a:p>
@@ -835,7 +836,7 @@
           <a:p>
             <a:fld id="{96DFF08F-DC6B-4601-B491-B0F83F6DD2DA}" type="datetimeFigureOut">
               <a:rPr lang="en-US" smtClean="0"/>
-              <a:t>10/24/2013</a:t>
+              <a:t>11/3/2014</a:t>
             </a:fld>
             <a:endParaRPr lang="en-US" dirty="0"/>
           </a:p>
@@ -1005,7 +1006,7 @@
           <a:p>
             <a:fld id="{D62CEF3B-A037-46D0-B02C-1428F07E9383}" type="datetimeFigureOut">
               <a:rPr lang="en-US" smtClean="0"/>
-              <a:t>10/24/2013</a:t>
+              <a:t>11/3/2014</a:t>
             </a:fld>
             <a:endParaRPr lang="en-US" dirty="0"/>
           </a:p>
@@ -1348,7 +1349,7 @@
           <a:p>
             <a:fld id="{96DFF08F-DC6B-4601-B491-B0F83F6DD2DA}" type="datetimeFigureOut">
               <a:rPr lang="en-US" smtClean="0"/>
-              <a:t>10/24/2013</a:t>
+              <a:t>11/3/2014</a:t>
             </a:fld>
             <a:endParaRPr lang="en-US" dirty="0"/>
           </a:p>
@@ -1623,7 +1624,7 @@
           <a:p>
             <a:fld id="{96DFF08F-DC6B-4601-B491-B0F83F6DD2DA}" type="datetimeFigureOut">
               <a:rPr lang="en-US" smtClean="0"/>
-              <a:t>10/24/2013</a:t>
+              <a:t>11/3/2014</a:t>
             </a:fld>
             <a:endParaRPr lang="en-US" dirty="0"/>
           </a:p>
@@ -2002,7 +2003,7 @@
           <a:p>
             <a:fld id="{96DFF08F-DC6B-4601-B491-B0F83F6DD2DA}" type="datetimeFigureOut">
               <a:rPr lang="en-US" smtClean="0"/>
-              <a:t>10/24/2013</a:t>
+              <a:t>11/3/2014</a:t>
             </a:fld>
             <a:endParaRPr lang="en-US" dirty="0"/>
           </a:p>
@@ -2120,7 +2121,7 @@
           <a:p>
             <a:fld id="{96DFF08F-DC6B-4601-B491-B0F83F6DD2DA}" type="datetimeFigureOut">
               <a:rPr lang="en-US" smtClean="0"/>
-              <a:t>10/24/2013</a:t>
+              <a:t>11/3/2014</a:t>
             </a:fld>
             <a:endParaRPr lang="en-US" dirty="0"/>
           </a:p>
@@ -2292,7 +2293,7 @@
             <a:fld id="{96DFF08F-DC6B-4601-B491-B0F83F6DD2DA}" type="datetimeFigureOut">
               <a:rPr lang="en-US" smtClean="0"/>
               <a:pPr/>
-              <a:t>10/24/2013</a:t>
+              <a:t>11/3/2014</a:t>
             </a:fld>
             <a:endParaRPr lang="en-US" dirty="0"/>
           </a:p>
@@ -2648,7 +2649,7 @@
             <a:fld id="{96DFF08F-DC6B-4601-B491-B0F83F6DD2DA}" type="datetimeFigureOut">
               <a:rPr lang="en-US" smtClean="0"/>
               <a:pPr/>
-              <a:t>10/24/2013</a:t>
+              <a:t>11/3/2014</a:t>
             </a:fld>
             <a:endParaRPr lang="en-US" dirty="0"/>
           </a:p>
@@ -3026,7 +3027,7 @@
           <a:p>
             <a:fld id="{96DFF08F-DC6B-4601-B491-B0F83F6DD2DA}" type="datetimeFigureOut">
               <a:rPr lang="en-US" smtClean="0"/>
-              <a:t>10/24/2013</a:t>
+              <a:t>11/3/2014</a:t>
             </a:fld>
             <a:endParaRPr lang="en-US" dirty="0"/>
           </a:p>
@@ -3314,7 +3315,7 @@
             <a:fld id="{96DFF08F-DC6B-4601-B491-B0F83F6DD2DA}" type="datetimeFigureOut">
               <a:rPr lang="en-US" smtClean="0"/>
               <a:pPr/>
-              <a:t>10/24/2013</a:t>
+              <a:t>11/3/2014</a:t>
             </a:fld>
             <a:endParaRPr lang="en-US" dirty="0"/>
           </a:p>
@@ -4456,7 +4457,7 @@
         <p:spPr/>
         <p:txBody>
           <a:bodyPr>
-            <a:normAutofit/>
+            <a:normAutofit fontScale="85000" lnSpcReduction="10000"/>
           </a:bodyPr>
           <a:lstStyle/>
           <a:p>
@@ -4469,42 +4470,53 @@
             </a:r>
             <a:r>
               <a:rPr lang="en-US" dirty="0" smtClean="0"/>
-              <a:t> for Visual </a:t>
+              <a:t> </a:t>
+            </a:r>
+            <a:r>
+              <a:rPr lang="en-US" dirty="0" smtClean="0"/>
+              <a:t>1.0 Tools for </a:t>
+            </a:r>
+            <a:r>
+              <a:rPr lang="en-US" dirty="0" smtClean="0"/>
+              <a:t>Visual </a:t>
             </a:r>
             <a:r>
               <a:rPr lang="en-US" dirty="0"/>
               <a:t>Studio 2012 </a:t>
             </a:r>
-            <a:r>
-              <a:rPr lang="en-US" dirty="0" smtClean="0"/>
-              <a:t>and 2013</a:t>
-            </a:r>
+            <a:endParaRPr lang="en-US" dirty="0" smtClean="0"/>
           </a:p>
           <a:p>
             <a:pPr marL="219456" lvl="1" indent="0">
               <a:buNone/>
             </a:pPr>
             <a:r>
+              <a:rPr lang="en-US" dirty="0">
+                <a:hlinkClick r:id="rId2"/>
+              </a:rPr>
+              <a:t>https://</a:t>
+            </a:r>
+            <a:r>
               <a:rPr lang="en-US" dirty="0" smtClean="0">
                 <a:hlinkClick r:id="rId2"/>
               </a:rPr>
-              <a:t>http</a:t>
-            </a:r>
-            <a:r>
-              <a:rPr lang="en-US" dirty="0">
-                <a:hlinkClick r:id="rId2"/>
-              </a:rPr>
-              <a:t>://</a:t>
-            </a:r>
+              <a:t>visualstudiogallery.msdn.microsoft.com/fa041d2d-5d77-494b-b0ba-8b4550792b4d</a:t>
+            </a:r>
+            <a:endParaRPr lang="en-US" dirty="0" smtClean="0"/>
+          </a:p>
+          <a:p>
+            <a:pPr marL="219456" lvl="1" indent="0">
+              <a:buNone/>
+            </a:pPr>
             <a:r>
               <a:rPr lang="en-US" dirty="0" smtClean="0">
-                <a:hlinkClick r:id="rId2"/>
-              </a:rPr>
-              <a:t>www.microsoft.com/en-us/download/details.aspx?id=34790</a:t>
+                <a:hlinkClick r:id="rId3"/>
+              </a:rPr>
+              <a:t>http://bit.ly/tsforvs2012</a:t>
             </a:r>
             <a:r>
               <a:rPr lang="en-US" dirty="0" smtClean="0"/>
-              <a:t> </a:t>
+              <a:t>  </a:t>
             </a:r>
           </a:p>
           <a:p>
@@ -4519,6 +4531,64 @@
             </a:pPr>
             <a:r>
               <a:rPr lang="en-US" dirty="0" smtClean="0"/>
+              <a:t>Visual Studio 2013 Update 3 (Update 2 works too)</a:t>
+            </a:r>
+            <a:endParaRPr lang="en-US" dirty="0" smtClean="0"/>
+          </a:p>
+          <a:p>
+            <a:pPr marL="219456" lvl="1" indent="0">
+              <a:buNone/>
+            </a:pPr>
+            <a:r>
+              <a:rPr lang="en-US" dirty="0">
+                <a:hlinkClick r:id="rId4"/>
+              </a:rPr>
+              <a:t>http://</a:t>
+            </a:r>
+            <a:r>
+              <a:rPr lang="en-US" dirty="0" smtClean="0">
+                <a:hlinkClick r:id="rId4"/>
+              </a:rPr>
+              <a:t>www.microsoft.com/en-us/download/details.aspx?id=43721</a:t>
+            </a:r>
+            <a:r>
+              <a:rPr lang="en-US" dirty="0" smtClean="0"/>
+              <a:t> </a:t>
+            </a:r>
+          </a:p>
+          <a:p>
+            <a:pPr marL="219456" lvl="1" indent="0">
+              <a:buNone/>
+            </a:pPr>
+            <a:r>
+              <a:rPr lang="en-US" dirty="0" smtClean="0">
+                <a:hlinkClick r:id="rId5"/>
+              </a:rPr>
+              <a:t>http://bit.ly/vs2013update3</a:t>
+            </a:r>
+            <a:r>
+              <a:rPr lang="en-US" dirty="0" smtClean="0"/>
+              <a:t> </a:t>
+            </a:r>
+          </a:p>
+          <a:p>
+            <a:pPr marL="219456" lvl="1" indent="0">
+              <a:buNone/>
+            </a:pPr>
+            <a:endParaRPr lang="en-US" dirty="0" smtClean="0"/>
+          </a:p>
+          <a:p>
+            <a:pPr marL="219456" lvl="1" indent="0">
+              <a:buNone/>
+            </a:pPr>
+            <a:endParaRPr lang="en-US" dirty="0"/>
+          </a:p>
+          <a:p>
+            <a:pPr marL="219456" lvl="1" indent="0">
+              <a:buNone/>
+            </a:pPr>
+            <a:r>
+              <a:rPr lang="en-US" dirty="0" smtClean="0"/>
               <a:t>Features</a:t>
             </a:r>
           </a:p>
@@ -4596,35 +4666,10 @@
             <a:endParaRPr lang="en-US" dirty="0" smtClean="0"/>
           </a:p>
           <a:p>
-            <a:pPr marL="505206" lvl="1" indent="-285750">
-              <a:buFont typeface="Arial" panose="020B0604020202020204" pitchFamily="34" charset="0"/>
-              <a:buChar char="•"/>
+            <a:pPr marL="219456" lvl="1" indent="0">
+              <a:buNone/>
             </a:pPr>
-            <a:r>
-              <a:rPr lang="en-US" dirty="0" smtClean="0"/>
-              <a:t>No longer requires Visual Studio Web Essentials</a:t>
-            </a:r>
-          </a:p>
-          <a:p>
-            <a:pPr marL="688086" lvl="2" indent="-285750">
-              <a:buFont typeface="Arial" panose="020B0604020202020204" pitchFamily="34" charset="0"/>
-              <a:buChar char="•"/>
-            </a:pPr>
-            <a:r>
-              <a:rPr lang="en-US" dirty="0" smtClean="0"/>
-              <a:t>Currently doesn’t have split screen editor </a:t>
-            </a:r>
-            <a:r>
-              <a:rPr lang="en-US" dirty="0" smtClean="0">
-                <a:sym typeface="Wingdings" panose="05000000000000000000" pitchFamily="2" charset="2"/>
-              </a:rPr>
-              <a:t></a:t>
-            </a:r>
-            <a:r>
-              <a:rPr lang="en-US" dirty="0" smtClean="0"/>
-              <a:t> </a:t>
-            </a:r>
-            <a:endParaRPr lang="en-US" dirty="0"/>
+            <a:endParaRPr lang="en-US" dirty="0" smtClean="0"/>
           </a:p>
           <a:p>
             <a:pPr marL="562356" lvl="1" indent="-342900">
@@ -4657,7 +4702,7 @@
           <p:nvPr/>
         </p:nvPicPr>
         <p:blipFill>
-          <a:blip r:embed="rId3">
+          <a:blip r:embed="rId6">
             <a:extLst>
               <a:ext uri="{28A0092B-C50C-407E-A947-70E740481C1C}">
                 <a14:useLocalDpi xmlns:a14="http://schemas.microsoft.com/office/drawing/2010/main" val="0"/>
@@ -4671,7 +4716,7 @@
         </p:blipFill>
         <p:spPr bwMode="auto">
           <a:xfrm>
-            <a:off x="7610800" y="453189"/>
+            <a:off x="7781281" y="1809291"/>
             <a:ext cx="1117586" cy="1117586"/>
           </a:xfrm>
           <a:prstGeom prst="rect">
@@ -4685,60 +4730,6 @@
                   <a:srgbClr val="FFFFFF"/>
                 </a:solidFill>
               </a14:hiddenFill>
-            </a:ext>
-          </a:extLst>
-        </p:spPr>
-      </p:pic>
-      <p:pic>
-        <p:nvPicPr>
-          <p:cNvPr id="2051" name="Picture 3"/>
-          <p:cNvPicPr>
-            <a:picLocks noChangeAspect="1" noChangeArrowheads="1"/>
-          </p:cNvPicPr>
-          <p:nvPr/>
-        </p:nvPicPr>
-        <p:blipFill>
-          <a:blip r:embed="rId4">
-            <a:extLst>
-              <a:ext uri="{28A0092B-C50C-407E-A947-70E740481C1C}">
-                <a14:useLocalDpi xmlns:a14="http://schemas.microsoft.com/office/drawing/2010/main" val="0"/>
-              </a:ext>
-            </a:extLst>
-          </a:blip>
-          <a:srcRect/>
-          <a:stretch>
-            <a:fillRect/>
-          </a:stretch>
-        </p:blipFill>
-        <p:spPr bwMode="auto">
-          <a:xfrm>
-            <a:off x="7114852" y="4342559"/>
-            <a:ext cx="1733550" cy="1676400"/>
-          </a:xfrm>
-          <a:prstGeom prst="rect">
-            <a:avLst/>
-          </a:prstGeom>
-          <a:noFill/>
-          <a:ln>
-            <a:noFill/>
-          </a:ln>
-          <a:extLst>
-            <a:ext uri="{909E8E84-426E-40DD-AFC4-6F175D3DCCD1}">
-              <a14:hiddenFill xmlns:a14="http://schemas.microsoft.com/office/drawing/2010/main">
-                <a:solidFill>
-                  <a:schemeClr val="accent1"/>
-                </a:solidFill>
-              </a14:hiddenFill>
-            </a:ext>
-            <a:ext uri="{91240B29-F687-4F45-9708-019B960494DF}">
-              <a14:hiddenLine xmlns:a14="http://schemas.microsoft.com/office/drawing/2010/main" w="9525">
-                <a:solidFill>
-                  <a:schemeClr val="tx1"/>
-                </a:solidFill>
-                <a:miter lim="800000"/>
-                <a:headEnd/>
-                <a:tailEnd/>
-              </a14:hiddenLine>
             </a:ext>
           </a:extLst>
         </p:spPr>
@@ -4796,12 +4787,8 @@
           <a:lstStyle/>
           <a:p>
             <a:r>
-              <a:rPr lang="en-US" dirty="0" err="1" smtClean="0"/>
-              <a:t>TypeScript</a:t>
-            </a:r>
-            <a:r>
               <a:rPr lang="en-US" dirty="0" smtClean="0"/>
-              <a:t> Bundle Transformer</a:t>
+              <a:t>Visual Studio Web Essentials</a:t>
             </a:r>
             <a:endParaRPr lang="en-US" dirty="0"/>
           </a:p>
@@ -4822,14 +4809,114 @@
           <a:bodyPr/>
           <a:lstStyle/>
           <a:p>
-            <a:endParaRPr lang="en-US"/>
+            <a:pPr marL="0" indent="0">
+              <a:buNone/>
+            </a:pPr>
+            <a:r>
+              <a:rPr lang="en-US" dirty="0" smtClean="0"/>
+              <a:t>Extra </a:t>
+            </a:r>
+            <a:r>
+              <a:rPr lang="en-US" dirty="0" err="1" smtClean="0"/>
+              <a:t>TypeScript</a:t>
+            </a:r>
+            <a:r>
+              <a:rPr lang="en-US" dirty="0" smtClean="0"/>
+              <a:t> Features</a:t>
+            </a:r>
+          </a:p>
+          <a:p>
+            <a:pPr marL="457200" indent="-457200">
+              <a:buFont typeface="+mj-lt"/>
+              <a:buAutoNum type="alphaLcParenR"/>
+            </a:pPr>
+            <a:r>
+              <a:rPr lang="en-US" dirty="0" smtClean="0"/>
+              <a:t>Side by Side Preview Pane</a:t>
+            </a:r>
+          </a:p>
+          <a:p>
+            <a:pPr marL="457200" indent="-457200">
+              <a:buFont typeface="+mj-lt"/>
+              <a:buAutoNum type="alphaLcParenR"/>
+            </a:pPr>
+            <a:r>
+              <a:rPr lang="en-US" dirty="0" err="1"/>
+              <a:t>TSLint</a:t>
+            </a:r>
+            <a:r>
+              <a:rPr lang="en-US" dirty="0"/>
+              <a:t> Support and </a:t>
+            </a:r>
+            <a:r>
+              <a:rPr lang="en-US" dirty="0" smtClean="0"/>
+              <a:t>Setting</a:t>
+            </a:r>
+          </a:p>
+          <a:p>
+            <a:pPr marL="457200" indent="-457200">
+              <a:buFont typeface="+mj-lt"/>
+              <a:buAutoNum type="alphaLcParenR"/>
+            </a:pPr>
+            <a:r>
+              <a:rPr lang="en-US" dirty="0" smtClean="0"/>
+              <a:t>Compile on Build / Compile on Save</a:t>
+            </a:r>
+          </a:p>
+          <a:p>
+            <a:pPr marL="457200" indent="-457200">
+              <a:buFont typeface="+mj-lt"/>
+              <a:buAutoNum type="alphaLcParenR"/>
+            </a:pPr>
+            <a:endParaRPr lang="en-US" dirty="0"/>
           </a:p>
         </p:txBody>
       </p:sp>
+      <p:pic>
+        <p:nvPicPr>
+          <p:cNvPr id="4" name="Picture 2" descr="C:\Users\adamsjl\Desktop\webessentialslogo.png"/>
+          <p:cNvPicPr>
+            <a:picLocks noChangeAspect="1" noChangeArrowheads="1"/>
+          </p:cNvPicPr>
+          <p:nvPr/>
+        </p:nvPicPr>
+        <p:blipFill>
+          <a:blip r:embed="rId2">
+            <a:extLst>
+              <a:ext uri="{28A0092B-C50C-407E-A947-70E740481C1C}">
+                <a14:useLocalDpi xmlns:a14="http://schemas.microsoft.com/office/drawing/2010/main" val="0"/>
+              </a:ext>
+            </a:extLst>
+          </a:blip>
+          <a:srcRect/>
+          <a:stretch>
+            <a:fillRect/>
+          </a:stretch>
+        </p:blipFill>
+        <p:spPr bwMode="auto">
+          <a:xfrm>
+            <a:off x="7693229" y="1856353"/>
+            <a:ext cx="1104900" cy="1247775"/>
+          </a:xfrm>
+          <a:prstGeom prst="rect">
+            <a:avLst/>
+          </a:prstGeom>
+          <a:noFill/>
+          <a:extLst>
+            <a:ext uri="{909E8E84-426E-40DD-AFC4-6F175D3DCCD1}">
+              <a14:hiddenFill xmlns:a14="http://schemas.microsoft.com/office/drawing/2010/main">
+                <a:solidFill>
+                  <a:srgbClr val="FFFFFF"/>
+                </a:solidFill>
+              </a14:hiddenFill>
+            </a:ext>
+          </a:extLst>
+        </p:spPr>
+      </p:pic>
     </p:spTree>
     <p:extLst>
       <p:ext uri="{BB962C8B-B14F-4D97-AF65-F5344CB8AC3E}">
-        <p14:creationId xmlns:p14="http://schemas.microsoft.com/office/powerpoint/2010/main" val="1440347270"/>
+        <p14:creationId xmlns:p14="http://schemas.microsoft.com/office/powerpoint/2010/main" val="4069496681"/>
       </p:ext>
     </p:extLst>
   </p:cSld>
@@ -4879,6 +4966,89 @@
           <a:lstStyle/>
           <a:p>
             <a:r>
+              <a:rPr lang="en-US" dirty="0" err="1" smtClean="0"/>
+              <a:t>TypeScript</a:t>
+            </a:r>
+            <a:r>
+              <a:rPr lang="en-US" dirty="0" smtClean="0"/>
+              <a:t> Bundle Transformer</a:t>
+            </a:r>
+            <a:endParaRPr lang="en-US" dirty="0"/>
+          </a:p>
+        </p:txBody>
+      </p:sp>
+      <p:sp>
+        <p:nvSpPr>
+          <p:cNvPr id="3" name="Content Placeholder 2"/>
+          <p:cNvSpPr>
+            <a:spLocks noGrp="1"/>
+          </p:cNvSpPr>
+          <p:nvPr>
+            <p:ph idx="1"/>
+          </p:nvPr>
+        </p:nvSpPr>
+        <p:spPr/>
+        <p:txBody>
+          <a:bodyPr/>
+          <a:lstStyle/>
+          <a:p>
+            <a:endParaRPr lang="en-US"/>
+          </a:p>
+        </p:txBody>
+      </p:sp>
+    </p:spTree>
+    <p:extLst>
+      <p:ext uri="{BB962C8B-B14F-4D97-AF65-F5344CB8AC3E}">
+        <p14:creationId xmlns:p14="http://schemas.microsoft.com/office/powerpoint/2010/main" val="1440347270"/>
+      </p:ext>
+    </p:extLst>
+  </p:cSld>
+  <p:clrMapOvr>
+    <a:masterClrMapping/>
+  </p:clrMapOvr>
+  <p:timing>
+    <p:tnLst>
+      <p:par>
+        <p:cTn id="1" dur="indefinite" restart="never" nodeType="tmRoot"/>
+      </p:par>
+    </p:tnLst>
+  </p:timing>
+</p:sld>
+</file>
+
+<file path=ppt/slides/slide15.xml><?xml version="1.0" encoding="utf-8"?>
+<p:sld xmlns:a="http://schemas.openxmlformats.org/drawingml/2006/main" xmlns:r="http://schemas.openxmlformats.org/officeDocument/2006/relationships" xmlns:p="http://schemas.openxmlformats.org/presentationml/2006/main">
+  <p:cSld>
+    <p:spTree>
+      <p:nvGrpSpPr>
+        <p:cNvPr id="1" name=""/>
+        <p:cNvGrpSpPr/>
+        <p:nvPr/>
+      </p:nvGrpSpPr>
+      <p:grpSpPr>
+        <a:xfrm>
+          <a:off x="0" y="0"/>
+          <a:ext cx="0" cy="0"/>
+          <a:chOff x="0" y="0"/>
+          <a:chExt cx="0" cy="0"/>
+        </a:xfrm>
+      </p:grpSpPr>
+      <p:sp>
+        <p:nvSpPr>
+          <p:cNvPr id="2" name="Title 1"/>
+          <p:cNvSpPr>
+            <a:spLocks noGrp="1"/>
+          </p:cNvSpPr>
+          <p:nvPr>
+            <p:ph type="title"/>
+          </p:nvPr>
+        </p:nvSpPr>
+        <p:spPr/>
+        <p:txBody>
+          <a:bodyPr/>
+          <a:lstStyle/>
+          <a:p>
+            <a:r>
               <a:rPr lang="en-US" dirty="0" smtClean="0"/>
               <a:t>Node Installation</a:t>
             </a:r>
@@ -5007,7 +5177,7 @@
 </p:sld>
 </file>
 
-<file path=ppt/slides/slide15.xml><?xml version="1.0" encoding="utf-8"?>
+<file path=ppt/slides/slide16.xml><?xml version="1.0" encoding="utf-8"?>
 <p:sld xmlns:a="http://schemas.openxmlformats.org/drawingml/2006/main" xmlns:r="http://schemas.openxmlformats.org/officeDocument/2006/relationships" xmlns:p="http://schemas.openxmlformats.org/presentationml/2006/main">
   <p:cSld>
     <p:spTree>
@@ -5307,7 +5477,7 @@
 </p:sld>
 </file>
 
-<file path=ppt/slides/slide16.xml><?xml version="1.0" encoding="utf-8"?>
+<file path=ppt/slides/slide17.xml><?xml version="1.0" encoding="utf-8"?>
 <p:sld xmlns:a="http://schemas.openxmlformats.org/drawingml/2006/main" xmlns:r="http://schemas.openxmlformats.org/officeDocument/2006/relationships" xmlns:p="http://schemas.openxmlformats.org/presentationml/2006/main">
   <p:cSld>
     <p:spTree>
@@ -5410,7 +5580,7 @@
 </p:sld>
 </file>
 
-<file path=ppt/slides/slide17.xml><?xml version="1.0" encoding="utf-8"?>
+<file path=ppt/slides/slide18.xml><?xml version="1.0" encoding="utf-8"?>
 <p:sld xmlns:a="http://schemas.openxmlformats.org/drawingml/2006/main" xmlns:r="http://schemas.openxmlformats.org/officeDocument/2006/relationships" xmlns:p="http://schemas.openxmlformats.org/presentationml/2006/main">
   <p:cSld>
     <p:spTree>
@@ -5636,78 +5806,6 @@
 </p:sld>
 </file>
 
-<file path=ppt/slides/slide18.xml><?xml version="1.0" encoding="utf-8"?>
-<p:sld xmlns:a="http://schemas.openxmlformats.org/drawingml/2006/main" xmlns:r="http://schemas.openxmlformats.org/officeDocument/2006/relationships" xmlns:p="http://schemas.openxmlformats.org/presentationml/2006/main">
-  <p:cSld>
-    <p:spTree>
-      <p:nvGrpSpPr>
-        <p:cNvPr id="1" name=""/>
-        <p:cNvGrpSpPr/>
-        <p:nvPr/>
-      </p:nvGrpSpPr>
-      <p:grpSpPr>
-        <a:xfrm>
-          <a:off x="0" y="0"/>
-          <a:ext cx="0" cy="0"/>
-          <a:chOff x="0" y="0"/>
-          <a:chExt cx="0" cy="0"/>
-        </a:xfrm>
-      </p:grpSpPr>
-      <p:sp>
-        <p:nvSpPr>
-          <p:cNvPr id="2" name="Title 1"/>
-          <p:cNvSpPr>
-            <a:spLocks noGrp="1"/>
-          </p:cNvSpPr>
-          <p:nvPr>
-            <p:ph type="ctrTitle"/>
-          </p:nvPr>
-        </p:nvSpPr>
-        <p:spPr/>
-        <p:txBody>
-          <a:bodyPr/>
-          <a:lstStyle/>
-          <a:p>
-            <a:r>
-              <a:rPr lang="en-US" dirty="0" smtClean="0"/>
-              <a:t>Static Typing Demo</a:t>
-            </a:r>
-            <a:endParaRPr lang="en-US" dirty="0"/>
-          </a:p>
-        </p:txBody>
-      </p:sp>
-      <p:sp>
-        <p:nvSpPr>
-          <p:cNvPr id="3" name="Subtitle 2"/>
-          <p:cNvSpPr>
-            <a:spLocks noGrp="1"/>
-          </p:cNvSpPr>
-          <p:nvPr>
-            <p:ph type="subTitle" idx="1"/>
-          </p:nvPr>
-        </p:nvSpPr>
-        <p:spPr/>
-        <p:txBody>
-          <a:bodyPr/>
-          <a:lstStyle/>
-          <a:p>
-            <a:endParaRPr lang="en-US"/>
-          </a:p>
-        </p:txBody>
-      </p:sp>
-    </p:spTree>
-    <p:extLst>
-      <p:ext uri="{BB962C8B-B14F-4D97-AF65-F5344CB8AC3E}">
-        <p14:creationId xmlns:p14="http://schemas.microsoft.com/office/powerpoint/2010/main" val="169849510"/>
-      </p:ext>
-    </p:extLst>
-  </p:cSld>
-  <p:clrMapOvr>
-    <a:masterClrMapping/>
-  </p:clrMapOvr>
-</p:sld>
-</file>
-
 <file path=ppt/slides/slide19.xml><?xml version="1.0" encoding="utf-8"?>
 <p:sld xmlns:a="http://schemas.openxmlformats.org/drawingml/2006/main" xmlns:r="http://schemas.openxmlformats.org/officeDocument/2006/relationships" xmlns:p="http://schemas.openxmlformats.org/presentationml/2006/main">
   <p:cSld>
@@ -5732,7 +5830,7 @@
             <a:spLocks noGrp="1"/>
           </p:cNvSpPr>
           <p:nvPr>
-            <p:ph type="title"/>
+            <p:ph type="ctrTitle"/>
           </p:nvPr>
         </p:nvSpPr>
         <p:spPr/>
@@ -5741,12 +5839,8 @@
           <a:lstStyle/>
           <a:p>
             <a:r>
-              <a:rPr lang="en-US" dirty="0" err="1" smtClean="0"/>
-              <a:t>Builtin</a:t>
-            </a:r>
-            <a:r>
               <a:rPr lang="en-US" dirty="0" smtClean="0"/>
-              <a:t> Types</a:t>
+              <a:t>Static Typing Demo</a:t>
             </a:r>
             <a:endParaRPr lang="en-US" dirty="0"/>
           </a:p>
@@ -5754,12 +5848,12 @@
       </p:sp>
       <p:sp>
         <p:nvSpPr>
-          <p:cNvPr id="3" name="Content Placeholder 2"/>
+          <p:cNvPr id="3" name="Subtitle 2"/>
           <p:cNvSpPr>
             <a:spLocks noGrp="1"/>
           </p:cNvSpPr>
           <p:nvPr>
-            <p:ph idx="1"/>
+            <p:ph type="subTitle" idx="1"/>
           </p:nvPr>
         </p:nvSpPr>
         <p:spPr/>
@@ -5767,89 +5861,14 @@
           <a:bodyPr/>
           <a:lstStyle/>
           <a:p>
-            <a:pPr marL="0" indent="0">
-              <a:buNone/>
-            </a:pPr>
-            <a:r>
-              <a:rPr lang="en-US" dirty="0"/>
-              <a:t>s</a:t>
-            </a:r>
-            <a:r>
-              <a:rPr lang="en-US" dirty="0" smtClean="0"/>
-              <a:t>tring</a:t>
-            </a:r>
-          </a:p>
-          <a:p>
-            <a:pPr marL="0" indent="0">
-              <a:buNone/>
-            </a:pPr>
-            <a:r>
-              <a:rPr lang="en-US" dirty="0"/>
-              <a:t>n</a:t>
-            </a:r>
-            <a:r>
-              <a:rPr lang="en-US" dirty="0" smtClean="0"/>
-              <a:t>umber</a:t>
-            </a:r>
-          </a:p>
-          <a:p>
-            <a:pPr marL="0" indent="0">
-              <a:buNone/>
-            </a:pPr>
-            <a:r>
-              <a:rPr lang="en-US" strike="sngStrike" dirty="0" err="1"/>
-              <a:t>b</a:t>
-            </a:r>
-            <a:r>
-              <a:rPr lang="en-US" strike="sngStrike" dirty="0" err="1" smtClean="0"/>
-              <a:t>ool</a:t>
-            </a:r>
-            <a:r>
-              <a:rPr lang="en-US" strike="sngStrike" dirty="0" smtClean="0"/>
-              <a:t> </a:t>
-            </a:r>
-            <a:r>
-              <a:rPr lang="en-US" smtClean="0"/>
-              <a:t>boolean</a:t>
-            </a:r>
-            <a:endParaRPr lang="en-US" strike="sngStrike" dirty="0" smtClean="0"/>
-          </a:p>
-          <a:p>
-            <a:pPr marL="0" indent="0">
-              <a:buNone/>
-            </a:pPr>
-            <a:r>
-              <a:rPr lang="en-US" dirty="0" smtClean="0"/>
-              <a:t>any</a:t>
-            </a:r>
-          </a:p>
-          <a:p>
-            <a:pPr marL="0" indent="0">
-              <a:buNone/>
-            </a:pPr>
-            <a:r>
-              <a:rPr lang="en-US" dirty="0" smtClean="0"/>
-              <a:t>Null</a:t>
-            </a:r>
-          </a:p>
-          <a:p>
-            <a:pPr marL="0" indent="0">
-              <a:buNone/>
-            </a:pPr>
-            <a:r>
-              <a:rPr lang="en-US" dirty="0" smtClean="0"/>
-              <a:t>undefined</a:t>
-            </a:r>
-          </a:p>
-          <a:p>
-            <a:endParaRPr lang="en-US" dirty="0"/>
+            <a:endParaRPr lang="en-US"/>
           </a:p>
         </p:txBody>
       </p:sp>
     </p:spTree>
     <p:extLst>
       <p:ext uri="{BB962C8B-B14F-4D97-AF65-F5344CB8AC3E}">
-        <p14:creationId xmlns:p14="http://schemas.microsoft.com/office/powerpoint/2010/main" val="1605760445"/>
+        <p14:creationId xmlns:p14="http://schemas.microsoft.com/office/powerpoint/2010/main" val="169849510"/>
       </p:ext>
     </p:extLst>
   </p:cSld>
@@ -5919,7 +5938,7 @@
         <p:spPr/>
         <p:txBody>
           <a:bodyPr>
-            <a:normAutofit fontScale="85000" lnSpcReduction="20000"/>
+            <a:normAutofit fontScale="92500" lnSpcReduction="10000"/>
           </a:bodyPr>
           <a:lstStyle/>
           <a:p>
@@ -5935,8 +5954,9 @@
           <a:p>
             <a:r>
               <a:rPr lang="en-US" dirty="0" smtClean="0"/>
-              <a:t>Senior Programmer Analyst</a:t>
-            </a:r>
+              <a:t>Software Architect</a:t>
+            </a:r>
+            <a:endParaRPr lang="en-US" dirty="0" smtClean="0"/>
           </a:p>
           <a:p>
             <a:r>
@@ -6021,25 +6041,9 @@
             </a:r>
           </a:p>
           <a:p>
-            <a:r>
-              <a:rPr lang="en-US" dirty="0" smtClean="0"/>
-              <a:t>speakerrate.com/</a:t>
-            </a:r>
-            <a:r>
-              <a:rPr lang="en-US" b="1" dirty="0" err="1" smtClean="0">
-                <a:solidFill>
-                  <a:schemeClr val="tx1"/>
-                </a:solidFill>
-              </a:rPr>
-              <a:t>jacobladams</a:t>
-            </a:r>
-            <a:r>
-              <a:rPr lang="en-US" dirty="0" smtClean="0"/>
-              <a:t> </a:t>
-            </a:r>
-            <a:endParaRPr lang="en-US" dirty="0"/>
-          </a:p>
-          <a:p>
+            <a:pPr marL="0" indent="0">
+              <a:buNone/>
+            </a:pPr>
             <a:endParaRPr lang="en-US" dirty="0"/>
           </a:p>
           <a:p>
@@ -6126,8 +6130,12 @@
           <a:lstStyle/>
           <a:p>
             <a:r>
+              <a:rPr lang="en-US" dirty="0" err="1" smtClean="0"/>
+              <a:t>Builtin</a:t>
+            </a:r>
+            <a:r>
               <a:rPr lang="en-US" dirty="0" smtClean="0"/>
-              <a:t>Implicit Typing</a:t>
+              <a:t> Types</a:t>
             </a:r>
             <a:endParaRPr lang="en-US" dirty="0"/>
           </a:p>
@@ -6145,601 +6153,122 @@
         </p:nvSpPr>
         <p:spPr/>
         <p:txBody>
-          <a:bodyPr>
-            <a:normAutofit fontScale="92500" lnSpcReduction="20000"/>
-          </a:bodyPr>
+          <a:bodyPr/>
           <a:lstStyle/>
           <a:p>
-            <a:pPr>
-              <a:lnSpc>
-                <a:spcPct val="120000"/>
-              </a:lnSpc>
-              <a:spcBef>
-                <a:spcPts val="0"/>
-              </a:spcBef>
-              <a:spcAft>
-                <a:spcPts val="0"/>
-              </a:spcAft>
+            <a:pPr marL="0" indent="0">
+              <a:buNone/>
             </a:pPr>
             <a:r>
-              <a:rPr lang="en-US" dirty="0" err="1">
-                <a:solidFill>
-                  <a:srgbClr val="0000FF"/>
-                </a:solidFill>
-                <a:highlight>
-                  <a:srgbClr val="FFFFFF"/>
-                </a:highlight>
-                <a:latin typeface="Consolas" panose="020B0609020204030204" pitchFamily="49" charset="0"/>
-              </a:rPr>
-              <a:t>var</a:t>
-            </a:r>
-            <a:r>
-              <a:rPr lang="en-US" dirty="0">
-                <a:solidFill>
-                  <a:srgbClr val="000000"/>
-                </a:solidFill>
-                <a:highlight>
-                  <a:srgbClr val="FFFFFF"/>
-                </a:highlight>
-                <a:latin typeface="Consolas" panose="020B0609020204030204" pitchFamily="49" charset="0"/>
-              </a:rPr>
-              <a:t> number1 = 1;            </a:t>
-            </a:r>
-            <a:r>
-              <a:rPr lang="en-US" dirty="0">
-                <a:solidFill>
-                  <a:srgbClr val="008000"/>
-                </a:solidFill>
-                <a:highlight>
-                  <a:srgbClr val="FFFFFF"/>
-                </a:highlight>
-                <a:latin typeface="Consolas" panose="020B0609020204030204" pitchFamily="49" charset="0"/>
-              </a:rPr>
-              <a:t>//number</a:t>
-            </a:r>
-            <a:endParaRPr lang="en-US" dirty="0">
-              <a:solidFill>
-                <a:srgbClr val="0000FF"/>
-              </a:solidFill>
-              <a:highlight>
-                <a:srgbClr val="FFFFFF"/>
-              </a:highlight>
-              <a:latin typeface="Consolas" panose="020B0609020204030204" pitchFamily="49" charset="0"/>
-            </a:endParaRPr>
-          </a:p>
-          <a:p>
-            <a:pPr>
-              <a:lnSpc>
-                <a:spcPct val="120000"/>
-              </a:lnSpc>
-              <a:spcBef>
-                <a:spcPts val="0"/>
-              </a:spcBef>
-              <a:spcAft>
-                <a:spcPts val="0"/>
-              </a:spcAft>
+              <a:rPr lang="en-US" dirty="0"/>
+              <a:t>s</a:t>
+            </a:r>
+            <a:r>
+              <a:rPr lang="en-US" dirty="0" smtClean="0"/>
+              <a:t>tring</a:t>
+            </a:r>
+          </a:p>
+          <a:p>
+            <a:pPr marL="0" indent="0">
+              <a:buNone/>
             </a:pPr>
-            <a:endParaRPr lang="en-US" dirty="0">
-              <a:solidFill>
-                <a:srgbClr val="0000FF"/>
-              </a:solidFill>
-              <a:highlight>
-                <a:srgbClr val="FFFFFF"/>
-              </a:highlight>
-              <a:latin typeface="Consolas" panose="020B0609020204030204" pitchFamily="49" charset="0"/>
-            </a:endParaRPr>
-          </a:p>
-          <a:p>
-            <a:pPr>
-              <a:lnSpc>
-                <a:spcPct val="120000"/>
-              </a:lnSpc>
-              <a:spcBef>
-                <a:spcPts val="0"/>
-              </a:spcBef>
-              <a:spcAft>
-                <a:spcPts val="0"/>
-              </a:spcAft>
+            <a:r>
+              <a:rPr lang="en-US" dirty="0"/>
+              <a:t>n</a:t>
+            </a:r>
+            <a:r>
+              <a:rPr lang="en-US" dirty="0" smtClean="0"/>
+              <a:t>umber</a:t>
+            </a:r>
+          </a:p>
+          <a:p>
+            <a:pPr marL="0" indent="0">
+              <a:buNone/>
             </a:pPr>
             <a:r>
-              <a:rPr lang="en-US" dirty="0" err="1">
-                <a:solidFill>
-                  <a:srgbClr val="0000FF"/>
-                </a:solidFill>
-                <a:highlight>
-                  <a:srgbClr val="FFFFFF"/>
-                </a:highlight>
-                <a:latin typeface="Consolas" panose="020B0609020204030204" pitchFamily="49" charset="0"/>
-              </a:rPr>
-              <a:t>var</a:t>
-            </a:r>
-            <a:r>
-              <a:rPr lang="en-US" dirty="0">
-                <a:solidFill>
-                  <a:srgbClr val="000000"/>
-                </a:solidFill>
-                <a:highlight>
-                  <a:srgbClr val="FFFFFF"/>
-                </a:highlight>
-                <a:latin typeface="Consolas" panose="020B0609020204030204" pitchFamily="49" charset="0"/>
-              </a:rPr>
-              <a:t> number2: </a:t>
-            </a:r>
-            <a:r>
-              <a:rPr lang="en-US" dirty="0">
-                <a:solidFill>
-                  <a:srgbClr val="0000FF"/>
-                </a:solidFill>
-                <a:highlight>
-                  <a:srgbClr val="FFFFFF"/>
-                </a:highlight>
-                <a:latin typeface="Consolas" panose="020B0609020204030204" pitchFamily="49" charset="0"/>
-              </a:rPr>
-              <a:t>number</a:t>
-            </a:r>
-            <a:r>
-              <a:rPr lang="en-US" dirty="0">
-                <a:solidFill>
-                  <a:srgbClr val="000000"/>
-                </a:solidFill>
-                <a:highlight>
-                  <a:srgbClr val="FFFFFF"/>
-                </a:highlight>
-                <a:latin typeface="Consolas" panose="020B0609020204030204" pitchFamily="49" charset="0"/>
-              </a:rPr>
-              <a:t> = 2;    </a:t>
-            </a:r>
-            <a:r>
-              <a:rPr lang="en-US" dirty="0">
-                <a:solidFill>
-                  <a:srgbClr val="008000"/>
-                </a:solidFill>
-                <a:highlight>
-                  <a:srgbClr val="FFFFFF"/>
-                </a:highlight>
-                <a:latin typeface="Consolas" panose="020B0609020204030204" pitchFamily="49" charset="0"/>
-              </a:rPr>
-              <a:t>//number</a:t>
-            </a:r>
-            <a:endParaRPr lang="en-US" dirty="0">
-              <a:solidFill>
-                <a:srgbClr val="0000FF"/>
-              </a:solidFill>
-              <a:highlight>
-                <a:srgbClr val="FFFFFF"/>
-              </a:highlight>
-              <a:latin typeface="Consolas" panose="020B0609020204030204" pitchFamily="49" charset="0"/>
-            </a:endParaRPr>
-          </a:p>
-          <a:p>
-            <a:pPr>
-              <a:lnSpc>
-                <a:spcPct val="120000"/>
-              </a:lnSpc>
-              <a:spcBef>
-                <a:spcPts val="0"/>
-              </a:spcBef>
-              <a:spcAft>
-                <a:spcPts val="0"/>
-              </a:spcAft>
+              <a:rPr lang="en-US" strike="sngStrike" dirty="0" err="1"/>
+              <a:t>b</a:t>
+            </a:r>
+            <a:r>
+              <a:rPr lang="en-US" strike="sngStrike" dirty="0" err="1" smtClean="0"/>
+              <a:t>ool</a:t>
+            </a:r>
+            <a:r>
+              <a:rPr lang="en-US" strike="sngStrike" dirty="0" smtClean="0"/>
+              <a:t> </a:t>
+            </a:r>
+            <a:r>
+              <a:rPr lang="en-US" dirty="0" err="1" smtClean="0"/>
+              <a:t>boolean</a:t>
+            </a:r>
+            <a:endParaRPr lang="en-US" strike="sngStrike" dirty="0" smtClean="0"/>
+          </a:p>
+          <a:p>
+            <a:pPr marL="0" indent="0">
+              <a:buNone/>
             </a:pPr>
-            <a:endParaRPr lang="en-US" dirty="0">
-              <a:solidFill>
-                <a:srgbClr val="0000FF"/>
-              </a:solidFill>
-              <a:highlight>
-                <a:srgbClr val="FFFFFF"/>
-              </a:highlight>
-              <a:latin typeface="Consolas" panose="020B0609020204030204" pitchFamily="49" charset="0"/>
-            </a:endParaRPr>
-          </a:p>
-          <a:p>
-            <a:pPr>
-              <a:lnSpc>
-                <a:spcPct val="120000"/>
-              </a:lnSpc>
-              <a:spcBef>
-                <a:spcPts val="0"/>
-              </a:spcBef>
-              <a:spcAft>
-                <a:spcPts val="0"/>
-              </a:spcAft>
+            <a:r>
+              <a:rPr lang="en-US" dirty="0"/>
+              <a:t>a</a:t>
+            </a:r>
+            <a:r>
+              <a:rPr lang="en-US" dirty="0" smtClean="0"/>
+              <a:t>rray</a:t>
+            </a:r>
+          </a:p>
+          <a:p>
+            <a:pPr marL="0" indent="0">
+              <a:buNone/>
             </a:pPr>
             <a:r>
-              <a:rPr lang="en-US" dirty="0" err="1">
-                <a:solidFill>
-                  <a:srgbClr val="0000FF"/>
-                </a:solidFill>
-                <a:highlight>
-                  <a:srgbClr val="FFFFFF"/>
-                </a:highlight>
-                <a:latin typeface="Consolas" panose="020B0609020204030204" pitchFamily="49" charset="0"/>
-              </a:rPr>
-              <a:t>var</a:t>
-            </a:r>
-            <a:r>
-              <a:rPr lang="en-US" dirty="0">
-                <a:solidFill>
-                  <a:srgbClr val="000000"/>
-                </a:solidFill>
-                <a:highlight>
-                  <a:srgbClr val="FFFFFF"/>
-                </a:highlight>
-                <a:latin typeface="Consolas" panose="020B0609020204030204" pitchFamily="49" charset="0"/>
-              </a:rPr>
-              <a:t> number3: </a:t>
-            </a:r>
-            <a:r>
-              <a:rPr lang="en-US" dirty="0">
-                <a:solidFill>
-                  <a:srgbClr val="0000FF"/>
-                </a:solidFill>
-                <a:highlight>
-                  <a:srgbClr val="FFFFFF"/>
-                </a:highlight>
-                <a:latin typeface="Consolas" panose="020B0609020204030204" pitchFamily="49" charset="0"/>
-              </a:rPr>
-              <a:t>number</a:t>
-            </a:r>
-            <a:r>
-              <a:rPr lang="en-US" dirty="0">
-                <a:solidFill>
-                  <a:srgbClr val="000000"/>
-                </a:solidFill>
-                <a:highlight>
-                  <a:srgbClr val="FFFFFF"/>
-                </a:highlight>
-                <a:latin typeface="Consolas" panose="020B0609020204030204" pitchFamily="49" charset="0"/>
-              </a:rPr>
-              <a:t>;        </a:t>
-            </a:r>
-            <a:r>
-              <a:rPr lang="en-US" dirty="0">
-                <a:solidFill>
-                  <a:srgbClr val="008000"/>
-                </a:solidFill>
-                <a:highlight>
-                  <a:srgbClr val="FFFFFF"/>
-                </a:highlight>
-                <a:latin typeface="Consolas" panose="020B0609020204030204" pitchFamily="49" charset="0"/>
-              </a:rPr>
-              <a:t>//number</a:t>
-            </a:r>
-            <a:endParaRPr lang="en-US" dirty="0">
-              <a:solidFill>
-                <a:srgbClr val="000000"/>
-              </a:solidFill>
-              <a:highlight>
-                <a:srgbClr val="FFFFFF"/>
-              </a:highlight>
-              <a:latin typeface="Consolas" panose="020B0609020204030204" pitchFamily="49" charset="0"/>
-            </a:endParaRPr>
-          </a:p>
-          <a:p>
-            <a:pPr>
-              <a:lnSpc>
-                <a:spcPct val="120000"/>
-              </a:lnSpc>
-              <a:spcBef>
-                <a:spcPts val="0"/>
-              </a:spcBef>
-              <a:spcAft>
-                <a:spcPts val="0"/>
-              </a:spcAft>
+              <a:rPr lang="en-US" dirty="0" err="1" smtClean="0"/>
+              <a:t>enum</a:t>
+            </a:r>
+            <a:endParaRPr lang="en-US" dirty="0" smtClean="0"/>
+          </a:p>
+          <a:p>
+            <a:pPr marL="0" indent="0">
+              <a:buNone/>
             </a:pPr>
             <a:r>
-              <a:rPr lang="en-US" dirty="0">
-                <a:solidFill>
-                  <a:srgbClr val="000000"/>
-                </a:solidFill>
-                <a:highlight>
-                  <a:srgbClr val="FFFFFF"/>
-                </a:highlight>
-                <a:latin typeface="Consolas" panose="020B0609020204030204" pitchFamily="49" charset="0"/>
-              </a:rPr>
-              <a:t>number3 = 3;</a:t>
-            </a:r>
-            <a:endParaRPr lang="en-US" dirty="0">
-              <a:solidFill>
-                <a:srgbClr val="0000FF"/>
-              </a:solidFill>
-              <a:highlight>
-                <a:srgbClr val="FFFFFF"/>
-              </a:highlight>
-              <a:latin typeface="Consolas" panose="020B0609020204030204" pitchFamily="49" charset="0"/>
-            </a:endParaRPr>
-          </a:p>
-          <a:p>
-            <a:pPr>
-              <a:lnSpc>
-                <a:spcPct val="120000"/>
-              </a:lnSpc>
-              <a:spcBef>
-                <a:spcPts val="0"/>
-              </a:spcBef>
-              <a:spcAft>
-                <a:spcPts val="0"/>
-              </a:spcAft>
+              <a:rPr lang="en-US" dirty="0" smtClean="0"/>
+              <a:t>any</a:t>
+            </a:r>
+            <a:endParaRPr lang="en-US" dirty="0" smtClean="0"/>
+          </a:p>
+          <a:p>
+            <a:pPr marL="0" indent="0">
+              <a:buNone/>
             </a:pPr>
-            <a:endParaRPr lang="en-US" dirty="0">
-              <a:solidFill>
-                <a:srgbClr val="0000FF"/>
-              </a:solidFill>
-              <a:highlight>
-                <a:srgbClr val="FFFFFF"/>
-              </a:highlight>
-              <a:latin typeface="Consolas" panose="020B0609020204030204" pitchFamily="49" charset="0"/>
-            </a:endParaRPr>
-          </a:p>
-          <a:p>
-            <a:pPr>
-              <a:lnSpc>
-                <a:spcPct val="120000"/>
-              </a:lnSpc>
-              <a:spcBef>
-                <a:spcPts val="0"/>
-              </a:spcBef>
-              <a:spcAft>
-                <a:spcPts val="0"/>
-              </a:spcAft>
+            <a:r>
+              <a:rPr lang="en-US" dirty="0" smtClean="0"/>
+              <a:t>Null</a:t>
+            </a:r>
+          </a:p>
+          <a:p>
+            <a:pPr marL="0" indent="0">
+              <a:buNone/>
             </a:pPr>
             <a:r>
-              <a:rPr lang="en-US" dirty="0" err="1">
-                <a:solidFill>
-                  <a:srgbClr val="0000FF"/>
-                </a:solidFill>
-                <a:highlight>
-                  <a:srgbClr val="FFFFFF"/>
-                </a:highlight>
-                <a:latin typeface="Consolas" panose="020B0609020204030204" pitchFamily="49" charset="0"/>
-              </a:rPr>
-              <a:t>var</a:t>
-            </a:r>
-            <a:r>
-              <a:rPr lang="en-US" dirty="0">
-                <a:solidFill>
-                  <a:srgbClr val="000000"/>
-                </a:solidFill>
-                <a:highlight>
-                  <a:srgbClr val="FFFFFF"/>
-                </a:highlight>
-                <a:latin typeface="Consolas" panose="020B0609020204030204" pitchFamily="49" charset="0"/>
-              </a:rPr>
-              <a:t> number4;                </a:t>
-            </a:r>
-            <a:r>
-              <a:rPr lang="en-US" dirty="0">
-                <a:solidFill>
-                  <a:srgbClr val="008000"/>
-                </a:solidFill>
-                <a:highlight>
-                  <a:srgbClr val="FFFFFF"/>
-                </a:highlight>
-                <a:latin typeface="Consolas" panose="020B0609020204030204" pitchFamily="49" charset="0"/>
-              </a:rPr>
-              <a:t>//any</a:t>
-            </a:r>
-            <a:endParaRPr lang="en-US" dirty="0">
-              <a:solidFill>
-                <a:srgbClr val="000000"/>
-              </a:solidFill>
-              <a:highlight>
-                <a:srgbClr val="FFFFFF"/>
-              </a:highlight>
-              <a:latin typeface="Consolas" panose="020B0609020204030204" pitchFamily="49" charset="0"/>
-            </a:endParaRPr>
-          </a:p>
-          <a:p>
-            <a:pPr>
-              <a:lnSpc>
-                <a:spcPct val="120000"/>
-              </a:lnSpc>
-              <a:spcBef>
-                <a:spcPts val="0"/>
-              </a:spcBef>
-              <a:spcAft>
-                <a:spcPts val="0"/>
-              </a:spcAft>
+              <a:rPr lang="en-US" dirty="0"/>
+              <a:t>u</a:t>
+            </a:r>
+            <a:r>
+              <a:rPr lang="en-US" dirty="0" smtClean="0"/>
+              <a:t>ndefined</a:t>
+            </a:r>
+          </a:p>
+          <a:p>
+            <a:pPr marL="0" indent="0">
+              <a:buNone/>
             </a:pPr>
             <a:r>
-              <a:rPr lang="en-US" dirty="0">
-                <a:solidFill>
-                  <a:srgbClr val="000000"/>
-                </a:solidFill>
-                <a:highlight>
-                  <a:srgbClr val="FFFFFF"/>
-                </a:highlight>
-                <a:latin typeface="Consolas" panose="020B0609020204030204" pitchFamily="49" charset="0"/>
-              </a:rPr>
-              <a:t>number4 = 4;</a:t>
-            </a:r>
-            <a:endParaRPr lang="en-US" dirty="0">
-              <a:solidFill>
-                <a:srgbClr val="0000FF"/>
-              </a:solidFill>
-              <a:highlight>
-                <a:srgbClr val="FFFFFF"/>
-              </a:highlight>
-              <a:latin typeface="Consolas" panose="020B0609020204030204" pitchFamily="49" charset="0"/>
-            </a:endParaRPr>
-          </a:p>
-          <a:p>
-            <a:pPr>
-              <a:lnSpc>
-                <a:spcPct val="120000"/>
-              </a:lnSpc>
-              <a:spcBef>
-                <a:spcPts val="0"/>
-              </a:spcBef>
-              <a:spcAft>
-                <a:spcPts val="0"/>
-              </a:spcAft>
-            </a:pPr>
-            <a:endParaRPr lang="en-US" dirty="0">
-              <a:solidFill>
-                <a:srgbClr val="0000FF"/>
-              </a:solidFill>
-              <a:highlight>
-                <a:srgbClr val="FFFFFF"/>
-              </a:highlight>
-              <a:latin typeface="Consolas" panose="020B0609020204030204" pitchFamily="49" charset="0"/>
-            </a:endParaRPr>
-          </a:p>
-          <a:p>
-            <a:pPr>
-              <a:lnSpc>
-                <a:spcPct val="120000"/>
-              </a:lnSpc>
-              <a:spcBef>
-                <a:spcPts val="0"/>
-              </a:spcBef>
-              <a:spcAft>
-                <a:spcPts val="0"/>
-              </a:spcAft>
-            </a:pPr>
-            <a:r>
-              <a:rPr lang="en-US" dirty="0">
-                <a:solidFill>
-                  <a:srgbClr val="0000FF"/>
-                </a:solidFill>
-                <a:highlight>
-                  <a:srgbClr val="FFFFFF"/>
-                </a:highlight>
-                <a:latin typeface="Consolas" panose="020B0609020204030204" pitchFamily="49" charset="0"/>
-              </a:rPr>
-              <a:t>function</a:t>
-            </a:r>
-            <a:r>
-              <a:rPr lang="en-US" dirty="0">
-                <a:solidFill>
-                  <a:srgbClr val="000000"/>
-                </a:solidFill>
-                <a:highlight>
-                  <a:srgbClr val="FFFFFF"/>
-                </a:highlight>
-                <a:latin typeface="Consolas" panose="020B0609020204030204" pitchFamily="49" charset="0"/>
-              </a:rPr>
-              <a:t> multiply(x, y) {   </a:t>
-            </a:r>
-            <a:r>
-              <a:rPr lang="en-US" dirty="0">
-                <a:solidFill>
-                  <a:srgbClr val="008000"/>
-                </a:solidFill>
-                <a:highlight>
-                  <a:srgbClr val="FFFFFF"/>
-                </a:highlight>
-                <a:latin typeface="Consolas" panose="020B0609020204030204" pitchFamily="49" charset="0"/>
-              </a:rPr>
-              <a:t>// (</a:t>
-            </a:r>
-            <a:r>
-              <a:rPr lang="en-US" dirty="0" err="1">
-                <a:solidFill>
-                  <a:srgbClr val="008000"/>
-                </a:solidFill>
-                <a:highlight>
-                  <a:srgbClr val="FFFFFF"/>
-                </a:highlight>
-                <a:latin typeface="Consolas" panose="020B0609020204030204" pitchFamily="49" charset="0"/>
-              </a:rPr>
-              <a:t>any,any</a:t>
-            </a:r>
-            <a:r>
-              <a:rPr lang="en-US" dirty="0">
-                <a:solidFill>
-                  <a:srgbClr val="008000"/>
-                </a:solidFill>
-                <a:highlight>
-                  <a:srgbClr val="FFFFFF"/>
-                </a:highlight>
-                <a:latin typeface="Consolas" panose="020B0609020204030204" pitchFamily="49" charset="0"/>
-              </a:rPr>
-              <a:t>) =&gt; number</a:t>
-            </a:r>
-            <a:endParaRPr lang="en-US" dirty="0">
-              <a:solidFill>
-                <a:srgbClr val="000000"/>
-              </a:solidFill>
-              <a:highlight>
-                <a:srgbClr val="FFFFFF"/>
-              </a:highlight>
-              <a:latin typeface="Consolas" panose="020B0609020204030204" pitchFamily="49" charset="0"/>
-            </a:endParaRPr>
-          </a:p>
-          <a:p>
-            <a:pPr>
-              <a:lnSpc>
-                <a:spcPct val="120000"/>
-              </a:lnSpc>
-              <a:spcBef>
-                <a:spcPts val="0"/>
-              </a:spcBef>
-              <a:spcAft>
-                <a:spcPts val="0"/>
-              </a:spcAft>
-            </a:pPr>
-            <a:r>
-              <a:rPr lang="en-US" dirty="0">
-                <a:solidFill>
-                  <a:srgbClr val="000000"/>
-                </a:solidFill>
-                <a:highlight>
-                  <a:srgbClr val="FFFFFF"/>
-                </a:highlight>
-                <a:latin typeface="Consolas" panose="020B0609020204030204" pitchFamily="49" charset="0"/>
-              </a:rPr>
-              <a:t>    </a:t>
-            </a:r>
-            <a:r>
-              <a:rPr lang="en-US" dirty="0">
-                <a:solidFill>
-                  <a:srgbClr val="0000FF"/>
-                </a:solidFill>
-                <a:highlight>
-                  <a:srgbClr val="FFFFFF"/>
-                </a:highlight>
-                <a:latin typeface="Consolas" panose="020B0609020204030204" pitchFamily="49" charset="0"/>
-              </a:rPr>
-              <a:t>return</a:t>
-            </a:r>
-            <a:r>
-              <a:rPr lang="en-US" dirty="0">
-                <a:solidFill>
-                  <a:srgbClr val="000000"/>
-                </a:solidFill>
-                <a:highlight>
-                  <a:srgbClr val="FFFFFF"/>
-                </a:highlight>
-                <a:latin typeface="Consolas" panose="020B0609020204030204" pitchFamily="49" charset="0"/>
-              </a:rPr>
-              <a:t> x * y;</a:t>
-            </a:r>
-          </a:p>
-          <a:p>
-            <a:pPr>
-              <a:lnSpc>
-                <a:spcPct val="120000"/>
-              </a:lnSpc>
-              <a:spcBef>
-                <a:spcPts val="0"/>
-              </a:spcBef>
-              <a:spcAft>
-                <a:spcPts val="0"/>
-              </a:spcAft>
-            </a:pPr>
-            <a:r>
-              <a:rPr lang="en-US" dirty="0">
-                <a:solidFill>
-                  <a:srgbClr val="000000"/>
-                </a:solidFill>
-                <a:highlight>
-                  <a:srgbClr val="FFFFFF"/>
-                </a:highlight>
-                <a:latin typeface="Consolas" panose="020B0609020204030204" pitchFamily="49" charset="0"/>
-              </a:rPr>
-              <a:t>}</a:t>
-            </a:r>
+              <a:rPr lang="en-US" dirty="0" smtClean="0"/>
+              <a:t>void</a:t>
+            </a:r>
+            <a:endParaRPr lang="en-US" dirty="0" smtClean="0"/>
+          </a:p>
+          <a:p>
             <a:endParaRPr lang="en-US" dirty="0"/>
           </a:p>
         </p:txBody>
@@ -6747,7 +6276,7 @@
     </p:spTree>
     <p:extLst>
       <p:ext uri="{BB962C8B-B14F-4D97-AF65-F5344CB8AC3E}">
-        <p14:creationId xmlns:p14="http://schemas.microsoft.com/office/powerpoint/2010/main" val="3462822165"/>
+        <p14:creationId xmlns:p14="http://schemas.microsoft.com/office/powerpoint/2010/main" val="1605760445"/>
       </p:ext>
     </p:extLst>
   </p:cSld>
@@ -6798,6 +6327,677 @@
           <a:p>
             <a:r>
               <a:rPr lang="en-US" dirty="0" smtClean="0"/>
+              <a:t>Implicit Typing</a:t>
+            </a:r>
+            <a:endParaRPr lang="en-US" dirty="0"/>
+          </a:p>
+        </p:txBody>
+      </p:sp>
+      <p:sp>
+        <p:nvSpPr>
+          <p:cNvPr id="3" name="Content Placeholder 2"/>
+          <p:cNvSpPr>
+            <a:spLocks noGrp="1"/>
+          </p:cNvSpPr>
+          <p:nvPr>
+            <p:ph idx="1"/>
+          </p:nvPr>
+        </p:nvSpPr>
+        <p:spPr/>
+        <p:txBody>
+          <a:bodyPr>
+            <a:normAutofit fontScale="92500" lnSpcReduction="20000"/>
+          </a:bodyPr>
+          <a:lstStyle/>
+          <a:p>
+            <a:pPr>
+              <a:lnSpc>
+                <a:spcPct val="120000"/>
+              </a:lnSpc>
+              <a:spcBef>
+                <a:spcPts val="0"/>
+              </a:spcBef>
+              <a:spcAft>
+                <a:spcPts val="0"/>
+              </a:spcAft>
+            </a:pPr>
+            <a:r>
+              <a:rPr lang="en-US" dirty="0" err="1">
+                <a:solidFill>
+                  <a:srgbClr val="0000FF"/>
+                </a:solidFill>
+                <a:highlight>
+                  <a:srgbClr val="FFFFFF"/>
+                </a:highlight>
+                <a:latin typeface="Consolas" panose="020B0609020204030204" pitchFamily="49" charset="0"/>
+              </a:rPr>
+              <a:t>var</a:t>
+            </a:r>
+            <a:r>
+              <a:rPr lang="en-US" dirty="0">
+                <a:solidFill>
+                  <a:srgbClr val="000000"/>
+                </a:solidFill>
+                <a:highlight>
+                  <a:srgbClr val="FFFFFF"/>
+                </a:highlight>
+                <a:latin typeface="Consolas" panose="020B0609020204030204" pitchFamily="49" charset="0"/>
+              </a:rPr>
+              <a:t> number1 = 1;            </a:t>
+            </a:r>
+            <a:r>
+              <a:rPr lang="en-US" dirty="0">
+                <a:solidFill>
+                  <a:srgbClr val="008000"/>
+                </a:solidFill>
+                <a:highlight>
+                  <a:srgbClr val="FFFFFF"/>
+                </a:highlight>
+                <a:latin typeface="Consolas" panose="020B0609020204030204" pitchFamily="49" charset="0"/>
+              </a:rPr>
+              <a:t>//number</a:t>
+            </a:r>
+            <a:endParaRPr lang="en-US" dirty="0">
+              <a:solidFill>
+                <a:srgbClr val="0000FF"/>
+              </a:solidFill>
+              <a:highlight>
+                <a:srgbClr val="FFFFFF"/>
+              </a:highlight>
+              <a:latin typeface="Consolas" panose="020B0609020204030204" pitchFamily="49" charset="0"/>
+            </a:endParaRPr>
+          </a:p>
+          <a:p>
+            <a:pPr>
+              <a:lnSpc>
+                <a:spcPct val="120000"/>
+              </a:lnSpc>
+              <a:spcBef>
+                <a:spcPts val="0"/>
+              </a:spcBef>
+              <a:spcAft>
+                <a:spcPts val="0"/>
+              </a:spcAft>
+            </a:pPr>
+            <a:endParaRPr lang="en-US" dirty="0">
+              <a:solidFill>
+                <a:srgbClr val="0000FF"/>
+              </a:solidFill>
+              <a:highlight>
+                <a:srgbClr val="FFFFFF"/>
+              </a:highlight>
+              <a:latin typeface="Consolas" panose="020B0609020204030204" pitchFamily="49" charset="0"/>
+            </a:endParaRPr>
+          </a:p>
+          <a:p>
+            <a:pPr>
+              <a:lnSpc>
+                <a:spcPct val="120000"/>
+              </a:lnSpc>
+              <a:spcBef>
+                <a:spcPts val="0"/>
+              </a:spcBef>
+              <a:spcAft>
+                <a:spcPts val="0"/>
+              </a:spcAft>
+            </a:pPr>
+            <a:r>
+              <a:rPr lang="en-US" dirty="0" err="1">
+                <a:solidFill>
+                  <a:srgbClr val="0000FF"/>
+                </a:solidFill>
+                <a:highlight>
+                  <a:srgbClr val="FFFFFF"/>
+                </a:highlight>
+                <a:latin typeface="Consolas" panose="020B0609020204030204" pitchFamily="49" charset="0"/>
+              </a:rPr>
+              <a:t>var</a:t>
+            </a:r>
+            <a:r>
+              <a:rPr lang="en-US" dirty="0">
+                <a:solidFill>
+                  <a:srgbClr val="000000"/>
+                </a:solidFill>
+                <a:highlight>
+                  <a:srgbClr val="FFFFFF"/>
+                </a:highlight>
+                <a:latin typeface="Consolas" panose="020B0609020204030204" pitchFamily="49" charset="0"/>
+              </a:rPr>
+              <a:t> number2: </a:t>
+            </a:r>
+            <a:r>
+              <a:rPr lang="en-US" dirty="0">
+                <a:solidFill>
+                  <a:srgbClr val="0000FF"/>
+                </a:solidFill>
+                <a:highlight>
+                  <a:srgbClr val="FFFFFF"/>
+                </a:highlight>
+                <a:latin typeface="Consolas" panose="020B0609020204030204" pitchFamily="49" charset="0"/>
+              </a:rPr>
+              <a:t>number</a:t>
+            </a:r>
+            <a:r>
+              <a:rPr lang="en-US" dirty="0">
+                <a:solidFill>
+                  <a:srgbClr val="000000"/>
+                </a:solidFill>
+                <a:highlight>
+                  <a:srgbClr val="FFFFFF"/>
+                </a:highlight>
+                <a:latin typeface="Consolas" panose="020B0609020204030204" pitchFamily="49" charset="0"/>
+              </a:rPr>
+              <a:t> = 2;    </a:t>
+            </a:r>
+            <a:r>
+              <a:rPr lang="en-US" dirty="0">
+                <a:solidFill>
+                  <a:srgbClr val="008000"/>
+                </a:solidFill>
+                <a:highlight>
+                  <a:srgbClr val="FFFFFF"/>
+                </a:highlight>
+                <a:latin typeface="Consolas" panose="020B0609020204030204" pitchFamily="49" charset="0"/>
+              </a:rPr>
+              <a:t>//number</a:t>
+            </a:r>
+            <a:endParaRPr lang="en-US" dirty="0">
+              <a:solidFill>
+                <a:srgbClr val="0000FF"/>
+              </a:solidFill>
+              <a:highlight>
+                <a:srgbClr val="FFFFFF"/>
+              </a:highlight>
+              <a:latin typeface="Consolas" panose="020B0609020204030204" pitchFamily="49" charset="0"/>
+            </a:endParaRPr>
+          </a:p>
+          <a:p>
+            <a:pPr>
+              <a:lnSpc>
+                <a:spcPct val="120000"/>
+              </a:lnSpc>
+              <a:spcBef>
+                <a:spcPts val="0"/>
+              </a:spcBef>
+              <a:spcAft>
+                <a:spcPts val="0"/>
+              </a:spcAft>
+            </a:pPr>
+            <a:endParaRPr lang="en-US" dirty="0">
+              <a:solidFill>
+                <a:srgbClr val="0000FF"/>
+              </a:solidFill>
+              <a:highlight>
+                <a:srgbClr val="FFFFFF"/>
+              </a:highlight>
+              <a:latin typeface="Consolas" panose="020B0609020204030204" pitchFamily="49" charset="0"/>
+            </a:endParaRPr>
+          </a:p>
+          <a:p>
+            <a:pPr>
+              <a:lnSpc>
+                <a:spcPct val="120000"/>
+              </a:lnSpc>
+              <a:spcBef>
+                <a:spcPts val="0"/>
+              </a:spcBef>
+              <a:spcAft>
+                <a:spcPts val="0"/>
+              </a:spcAft>
+            </a:pPr>
+            <a:r>
+              <a:rPr lang="en-US" dirty="0" err="1">
+                <a:solidFill>
+                  <a:srgbClr val="0000FF"/>
+                </a:solidFill>
+                <a:highlight>
+                  <a:srgbClr val="FFFFFF"/>
+                </a:highlight>
+                <a:latin typeface="Consolas" panose="020B0609020204030204" pitchFamily="49" charset="0"/>
+              </a:rPr>
+              <a:t>var</a:t>
+            </a:r>
+            <a:r>
+              <a:rPr lang="en-US" dirty="0">
+                <a:solidFill>
+                  <a:srgbClr val="000000"/>
+                </a:solidFill>
+                <a:highlight>
+                  <a:srgbClr val="FFFFFF"/>
+                </a:highlight>
+                <a:latin typeface="Consolas" panose="020B0609020204030204" pitchFamily="49" charset="0"/>
+              </a:rPr>
+              <a:t> number3: </a:t>
+            </a:r>
+            <a:r>
+              <a:rPr lang="en-US" dirty="0">
+                <a:solidFill>
+                  <a:srgbClr val="0000FF"/>
+                </a:solidFill>
+                <a:highlight>
+                  <a:srgbClr val="FFFFFF"/>
+                </a:highlight>
+                <a:latin typeface="Consolas" panose="020B0609020204030204" pitchFamily="49" charset="0"/>
+              </a:rPr>
+              <a:t>number</a:t>
+            </a:r>
+            <a:r>
+              <a:rPr lang="en-US" dirty="0">
+                <a:solidFill>
+                  <a:srgbClr val="000000"/>
+                </a:solidFill>
+                <a:highlight>
+                  <a:srgbClr val="FFFFFF"/>
+                </a:highlight>
+                <a:latin typeface="Consolas" panose="020B0609020204030204" pitchFamily="49" charset="0"/>
+              </a:rPr>
+              <a:t>;        </a:t>
+            </a:r>
+            <a:r>
+              <a:rPr lang="en-US" dirty="0">
+                <a:solidFill>
+                  <a:srgbClr val="008000"/>
+                </a:solidFill>
+                <a:highlight>
+                  <a:srgbClr val="FFFFFF"/>
+                </a:highlight>
+                <a:latin typeface="Consolas" panose="020B0609020204030204" pitchFamily="49" charset="0"/>
+              </a:rPr>
+              <a:t>//number</a:t>
+            </a:r>
+            <a:endParaRPr lang="en-US" dirty="0">
+              <a:solidFill>
+                <a:srgbClr val="000000"/>
+              </a:solidFill>
+              <a:highlight>
+                <a:srgbClr val="FFFFFF"/>
+              </a:highlight>
+              <a:latin typeface="Consolas" panose="020B0609020204030204" pitchFamily="49" charset="0"/>
+            </a:endParaRPr>
+          </a:p>
+          <a:p>
+            <a:pPr>
+              <a:lnSpc>
+                <a:spcPct val="120000"/>
+              </a:lnSpc>
+              <a:spcBef>
+                <a:spcPts val="0"/>
+              </a:spcBef>
+              <a:spcAft>
+                <a:spcPts val="0"/>
+              </a:spcAft>
+            </a:pPr>
+            <a:r>
+              <a:rPr lang="en-US" dirty="0">
+                <a:solidFill>
+                  <a:srgbClr val="000000"/>
+                </a:solidFill>
+                <a:highlight>
+                  <a:srgbClr val="FFFFFF"/>
+                </a:highlight>
+                <a:latin typeface="Consolas" panose="020B0609020204030204" pitchFamily="49" charset="0"/>
+              </a:rPr>
+              <a:t>number3 = 3;</a:t>
+            </a:r>
+            <a:endParaRPr lang="en-US" dirty="0">
+              <a:solidFill>
+                <a:srgbClr val="0000FF"/>
+              </a:solidFill>
+              <a:highlight>
+                <a:srgbClr val="FFFFFF"/>
+              </a:highlight>
+              <a:latin typeface="Consolas" panose="020B0609020204030204" pitchFamily="49" charset="0"/>
+            </a:endParaRPr>
+          </a:p>
+          <a:p>
+            <a:pPr>
+              <a:lnSpc>
+                <a:spcPct val="120000"/>
+              </a:lnSpc>
+              <a:spcBef>
+                <a:spcPts val="0"/>
+              </a:spcBef>
+              <a:spcAft>
+                <a:spcPts val="0"/>
+              </a:spcAft>
+            </a:pPr>
+            <a:endParaRPr lang="en-US" dirty="0">
+              <a:solidFill>
+                <a:srgbClr val="0000FF"/>
+              </a:solidFill>
+              <a:highlight>
+                <a:srgbClr val="FFFFFF"/>
+              </a:highlight>
+              <a:latin typeface="Consolas" panose="020B0609020204030204" pitchFamily="49" charset="0"/>
+            </a:endParaRPr>
+          </a:p>
+          <a:p>
+            <a:pPr>
+              <a:lnSpc>
+                <a:spcPct val="120000"/>
+              </a:lnSpc>
+              <a:spcBef>
+                <a:spcPts val="0"/>
+              </a:spcBef>
+              <a:spcAft>
+                <a:spcPts val="0"/>
+              </a:spcAft>
+            </a:pPr>
+            <a:r>
+              <a:rPr lang="en-US" dirty="0" err="1">
+                <a:solidFill>
+                  <a:srgbClr val="0000FF"/>
+                </a:solidFill>
+                <a:highlight>
+                  <a:srgbClr val="FFFFFF"/>
+                </a:highlight>
+                <a:latin typeface="Consolas" panose="020B0609020204030204" pitchFamily="49" charset="0"/>
+              </a:rPr>
+              <a:t>var</a:t>
+            </a:r>
+            <a:r>
+              <a:rPr lang="en-US" dirty="0">
+                <a:solidFill>
+                  <a:srgbClr val="000000"/>
+                </a:solidFill>
+                <a:highlight>
+                  <a:srgbClr val="FFFFFF"/>
+                </a:highlight>
+                <a:latin typeface="Consolas" panose="020B0609020204030204" pitchFamily="49" charset="0"/>
+              </a:rPr>
+              <a:t> number4;                </a:t>
+            </a:r>
+            <a:r>
+              <a:rPr lang="en-US" dirty="0">
+                <a:solidFill>
+                  <a:srgbClr val="008000"/>
+                </a:solidFill>
+                <a:highlight>
+                  <a:srgbClr val="FFFFFF"/>
+                </a:highlight>
+                <a:latin typeface="Consolas" panose="020B0609020204030204" pitchFamily="49" charset="0"/>
+              </a:rPr>
+              <a:t>//any</a:t>
+            </a:r>
+            <a:endParaRPr lang="en-US" dirty="0">
+              <a:solidFill>
+                <a:srgbClr val="000000"/>
+              </a:solidFill>
+              <a:highlight>
+                <a:srgbClr val="FFFFFF"/>
+              </a:highlight>
+              <a:latin typeface="Consolas" panose="020B0609020204030204" pitchFamily="49" charset="0"/>
+            </a:endParaRPr>
+          </a:p>
+          <a:p>
+            <a:pPr>
+              <a:lnSpc>
+                <a:spcPct val="120000"/>
+              </a:lnSpc>
+              <a:spcBef>
+                <a:spcPts val="0"/>
+              </a:spcBef>
+              <a:spcAft>
+                <a:spcPts val="0"/>
+              </a:spcAft>
+            </a:pPr>
+            <a:r>
+              <a:rPr lang="en-US" dirty="0">
+                <a:solidFill>
+                  <a:srgbClr val="000000"/>
+                </a:solidFill>
+                <a:highlight>
+                  <a:srgbClr val="FFFFFF"/>
+                </a:highlight>
+                <a:latin typeface="Consolas" panose="020B0609020204030204" pitchFamily="49" charset="0"/>
+              </a:rPr>
+              <a:t>number4 = 4;</a:t>
+            </a:r>
+            <a:endParaRPr lang="en-US" dirty="0">
+              <a:solidFill>
+                <a:srgbClr val="0000FF"/>
+              </a:solidFill>
+              <a:highlight>
+                <a:srgbClr val="FFFFFF"/>
+              </a:highlight>
+              <a:latin typeface="Consolas" panose="020B0609020204030204" pitchFamily="49" charset="0"/>
+            </a:endParaRPr>
+          </a:p>
+          <a:p>
+            <a:pPr>
+              <a:lnSpc>
+                <a:spcPct val="120000"/>
+              </a:lnSpc>
+              <a:spcBef>
+                <a:spcPts val="0"/>
+              </a:spcBef>
+              <a:spcAft>
+                <a:spcPts val="0"/>
+              </a:spcAft>
+            </a:pPr>
+            <a:endParaRPr lang="en-US" dirty="0">
+              <a:solidFill>
+                <a:srgbClr val="0000FF"/>
+              </a:solidFill>
+              <a:highlight>
+                <a:srgbClr val="FFFFFF"/>
+              </a:highlight>
+              <a:latin typeface="Consolas" panose="020B0609020204030204" pitchFamily="49" charset="0"/>
+            </a:endParaRPr>
+          </a:p>
+          <a:p>
+            <a:pPr>
+              <a:lnSpc>
+                <a:spcPct val="120000"/>
+              </a:lnSpc>
+              <a:spcBef>
+                <a:spcPts val="0"/>
+              </a:spcBef>
+              <a:spcAft>
+                <a:spcPts val="0"/>
+              </a:spcAft>
+            </a:pPr>
+            <a:r>
+              <a:rPr lang="en-US" dirty="0">
+                <a:solidFill>
+                  <a:srgbClr val="0000FF"/>
+                </a:solidFill>
+                <a:highlight>
+                  <a:srgbClr val="FFFFFF"/>
+                </a:highlight>
+                <a:latin typeface="Consolas" panose="020B0609020204030204" pitchFamily="49" charset="0"/>
+              </a:rPr>
+              <a:t>function</a:t>
+            </a:r>
+            <a:r>
+              <a:rPr lang="en-US" dirty="0">
+                <a:solidFill>
+                  <a:srgbClr val="000000"/>
+                </a:solidFill>
+                <a:highlight>
+                  <a:srgbClr val="FFFFFF"/>
+                </a:highlight>
+                <a:latin typeface="Consolas" panose="020B0609020204030204" pitchFamily="49" charset="0"/>
+              </a:rPr>
+              <a:t> multiply(x, y) {   </a:t>
+            </a:r>
+            <a:r>
+              <a:rPr lang="en-US" dirty="0">
+                <a:solidFill>
+                  <a:srgbClr val="008000"/>
+                </a:solidFill>
+                <a:highlight>
+                  <a:srgbClr val="FFFFFF"/>
+                </a:highlight>
+                <a:latin typeface="Consolas" panose="020B0609020204030204" pitchFamily="49" charset="0"/>
+              </a:rPr>
+              <a:t>// (</a:t>
+            </a:r>
+            <a:r>
+              <a:rPr lang="en-US" dirty="0" err="1">
+                <a:solidFill>
+                  <a:srgbClr val="008000"/>
+                </a:solidFill>
+                <a:highlight>
+                  <a:srgbClr val="FFFFFF"/>
+                </a:highlight>
+                <a:latin typeface="Consolas" panose="020B0609020204030204" pitchFamily="49" charset="0"/>
+              </a:rPr>
+              <a:t>any,any</a:t>
+            </a:r>
+            <a:r>
+              <a:rPr lang="en-US" dirty="0">
+                <a:solidFill>
+                  <a:srgbClr val="008000"/>
+                </a:solidFill>
+                <a:highlight>
+                  <a:srgbClr val="FFFFFF"/>
+                </a:highlight>
+                <a:latin typeface="Consolas" panose="020B0609020204030204" pitchFamily="49" charset="0"/>
+              </a:rPr>
+              <a:t>) =&gt; number</a:t>
+            </a:r>
+            <a:endParaRPr lang="en-US" dirty="0">
+              <a:solidFill>
+                <a:srgbClr val="000000"/>
+              </a:solidFill>
+              <a:highlight>
+                <a:srgbClr val="FFFFFF"/>
+              </a:highlight>
+              <a:latin typeface="Consolas" panose="020B0609020204030204" pitchFamily="49" charset="0"/>
+            </a:endParaRPr>
+          </a:p>
+          <a:p>
+            <a:pPr>
+              <a:lnSpc>
+                <a:spcPct val="120000"/>
+              </a:lnSpc>
+              <a:spcBef>
+                <a:spcPts val="0"/>
+              </a:spcBef>
+              <a:spcAft>
+                <a:spcPts val="0"/>
+              </a:spcAft>
+            </a:pPr>
+            <a:r>
+              <a:rPr lang="en-US" dirty="0">
+                <a:solidFill>
+                  <a:srgbClr val="000000"/>
+                </a:solidFill>
+                <a:highlight>
+                  <a:srgbClr val="FFFFFF"/>
+                </a:highlight>
+                <a:latin typeface="Consolas" panose="020B0609020204030204" pitchFamily="49" charset="0"/>
+              </a:rPr>
+              <a:t>    </a:t>
+            </a:r>
+            <a:r>
+              <a:rPr lang="en-US" dirty="0">
+                <a:solidFill>
+                  <a:srgbClr val="0000FF"/>
+                </a:solidFill>
+                <a:highlight>
+                  <a:srgbClr val="FFFFFF"/>
+                </a:highlight>
+                <a:latin typeface="Consolas" panose="020B0609020204030204" pitchFamily="49" charset="0"/>
+              </a:rPr>
+              <a:t>return</a:t>
+            </a:r>
+            <a:r>
+              <a:rPr lang="en-US" dirty="0">
+                <a:solidFill>
+                  <a:srgbClr val="000000"/>
+                </a:solidFill>
+                <a:highlight>
+                  <a:srgbClr val="FFFFFF"/>
+                </a:highlight>
+                <a:latin typeface="Consolas" panose="020B0609020204030204" pitchFamily="49" charset="0"/>
+              </a:rPr>
+              <a:t> x * y;</a:t>
+            </a:r>
+          </a:p>
+          <a:p>
+            <a:pPr>
+              <a:lnSpc>
+                <a:spcPct val="120000"/>
+              </a:lnSpc>
+              <a:spcBef>
+                <a:spcPts val="0"/>
+              </a:spcBef>
+              <a:spcAft>
+                <a:spcPts val="0"/>
+              </a:spcAft>
+            </a:pPr>
+            <a:r>
+              <a:rPr lang="en-US" dirty="0">
+                <a:solidFill>
+                  <a:srgbClr val="000000"/>
+                </a:solidFill>
+                <a:highlight>
+                  <a:srgbClr val="FFFFFF"/>
+                </a:highlight>
+                <a:latin typeface="Consolas" panose="020B0609020204030204" pitchFamily="49" charset="0"/>
+              </a:rPr>
+              <a:t>}</a:t>
+            </a:r>
+            <a:endParaRPr lang="en-US" dirty="0"/>
+          </a:p>
+        </p:txBody>
+      </p:sp>
+    </p:spTree>
+    <p:extLst>
+      <p:ext uri="{BB962C8B-B14F-4D97-AF65-F5344CB8AC3E}">
+        <p14:creationId xmlns:p14="http://schemas.microsoft.com/office/powerpoint/2010/main" val="3462822165"/>
+      </p:ext>
+    </p:extLst>
+  </p:cSld>
+  <p:clrMapOvr>
+    <a:masterClrMapping/>
+  </p:clrMapOvr>
+  <p:timing>
+    <p:tnLst>
+      <p:par>
+        <p:cTn id="1" dur="indefinite" restart="never" nodeType="tmRoot"/>
+      </p:par>
+    </p:tnLst>
+  </p:timing>
+</p:sld>
+</file>
+
+<file path=ppt/slides/slide22.xml><?xml version="1.0" encoding="utf-8"?>
+<p:sld xmlns:a="http://schemas.openxmlformats.org/drawingml/2006/main" xmlns:r="http://schemas.openxmlformats.org/officeDocument/2006/relationships" xmlns:p="http://schemas.openxmlformats.org/presentationml/2006/main">
+  <p:cSld>
+    <p:spTree>
+      <p:nvGrpSpPr>
+        <p:cNvPr id="1" name=""/>
+        <p:cNvGrpSpPr/>
+        <p:nvPr/>
+      </p:nvGrpSpPr>
+      <p:grpSpPr>
+        <a:xfrm>
+          <a:off x="0" y="0"/>
+          <a:ext cx="0" cy="0"/>
+          <a:chOff x="0" y="0"/>
+          <a:chExt cx="0" cy="0"/>
+        </a:xfrm>
+      </p:grpSpPr>
+      <p:sp>
+        <p:nvSpPr>
+          <p:cNvPr id="2" name="Title 1"/>
+          <p:cNvSpPr>
+            <a:spLocks noGrp="1"/>
+          </p:cNvSpPr>
+          <p:nvPr>
+            <p:ph type="title"/>
+          </p:nvPr>
+        </p:nvSpPr>
+        <p:spPr/>
+        <p:txBody>
+          <a:bodyPr/>
+          <a:lstStyle/>
+          <a:p>
+            <a:r>
+              <a:rPr lang="en-US" dirty="0" smtClean="0"/>
               <a:t>Typing - Parameters</a:t>
             </a:r>
             <a:endParaRPr lang="en-US" dirty="0"/>
@@ -7279,7 +7479,7 @@
 </p:sld>
 </file>
 
-<file path=ppt/slides/slide22.xml><?xml version="1.0" encoding="utf-8"?>
+<file path=ppt/slides/slide23.xml><?xml version="1.0" encoding="utf-8"?>
 <p:sld xmlns:a="http://schemas.openxmlformats.org/drawingml/2006/main" xmlns:r="http://schemas.openxmlformats.org/officeDocument/2006/relationships" xmlns:p="http://schemas.openxmlformats.org/presentationml/2006/main">
   <p:cSld>
     <p:spTree>
@@ -7378,10 +7578,17 @@
   <p:clrMapOvr>
     <a:masterClrMapping/>
   </p:clrMapOvr>
+  <p:timing>
+    <p:tnLst>
+      <p:par>
+        <p:cTn id="1" dur="indefinite" restart="never" nodeType="tmRoot"/>
+      </p:par>
+    </p:tnLst>
+  </p:timing>
 </p:sld>
 </file>
 
-<file path=ppt/slides/slide23.xml><?xml version="1.0" encoding="utf-8"?>
+<file path=ppt/slides/slide24.xml><?xml version="1.0" encoding="utf-8"?>
 <p:sld xmlns:a="http://schemas.openxmlformats.org/drawingml/2006/main" xmlns:r="http://schemas.openxmlformats.org/officeDocument/2006/relationships" xmlns:p="http://schemas.openxmlformats.org/presentationml/2006/main">
   <p:cSld>
     <p:spTree>
@@ -7434,7 +7641,7 @@
         <p:spPr/>
         <p:txBody>
           <a:bodyPr>
-            <a:normAutofit fontScale="92500" lnSpcReduction="10000"/>
+            <a:normAutofit/>
           </a:bodyPr>
           <a:lstStyle/>
           <a:p>
@@ -7523,37 +7730,15 @@
             <a:endParaRPr lang="en-US" sz="2800" dirty="0" smtClean="0"/>
           </a:p>
           <a:p>
+            <a:endParaRPr lang="en-US" sz="2800" dirty="0"/>
+          </a:p>
+          <a:p>
             <a:r>
               <a:rPr lang="en-US" sz="2800" dirty="0"/>
-              <a:t>speakerrate.com/</a:t>
-            </a:r>
-            <a:r>
-              <a:rPr lang="en-US" sz="2800" b="1" dirty="0" err="1">
-                <a:solidFill>
-                  <a:schemeClr val="tx1"/>
-                </a:solidFill>
-              </a:rPr>
-              <a:t>jacobladams</a:t>
-            </a:r>
-            <a:r>
-              <a:rPr lang="en-US" sz="2800" dirty="0"/>
-              <a:t> </a:t>
-            </a:r>
-          </a:p>
-          <a:p>
-            <a:endParaRPr lang="en-US" sz="2800" dirty="0"/>
-          </a:p>
-          <a:p>
-            <a:r>
-              <a:rPr lang="en-US" sz="2800"/>
-              <a:t>Bit.ly </a:t>
-            </a:r>
-            <a:r>
-              <a:rPr lang="en-US" sz="2800" dirty="0"/>
-              <a:t>b</a:t>
-            </a:r>
-            <a:r>
-              <a:rPr lang="en-US" sz="2800" smtClean="0"/>
+              <a:t>Bit.ly b</a:t>
+            </a:r>
+            <a:r>
+              <a:rPr lang="en-US" sz="2800" dirty="0" smtClean="0"/>
               <a:t>undle </a:t>
             </a:r>
             <a:r>
@@ -7586,6 +7771,13 @@
   <p:clrMapOvr>
     <a:masterClrMapping/>
   </p:clrMapOvr>
+  <p:timing>
+    <p:tnLst>
+      <p:par>
+        <p:cTn id="1" dur="indefinite" restart="never" nodeType="tmRoot"/>
+      </p:par>
+    </p:tnLst>
+  </p:timing>
 </p:sld>
 </file>
 
@@ -7663,8 +7855,13 @@
             </a:r>
             <a:r>
               <a:rPr lang="en-US" dirty="0"/>
-              <a:t> is a language for application-scale JavaScript development.</a:t>
-            </a:r>
+              <a:t> </a:t>
+            </a:r>
+            <a:r>
+              <a:rPr lang="en-US" dirty="0" smtClean="0"/>
+              <a:t>lets you write JavaScript the way you really want to.</a:t>
+            </a:r>
+            <a:endParaRPr lang="en-US" dirty="0"/>
           </a:p>
           <a:p>
             <a:r>
@@ -11064,7 +11261,15 @@
             </a:pPr>
             <a:r>
               <a:rPr lang="en-US" dirty="0" smtClean="0"/>
-              <a:t>Still in Beta (0.9.1.1 as of this presentation)</a:t>
+              <a:t>Only </a:t>
+            </a:r>
+            <a:r>
+              <a:rPr lang="en-US" dirty="0" smtClean="0"/>
+              <a:t>Available in Visual Studio 2012 &amp; </a:t>
+            </a:r>
+            <a:r>
+              <a:rPr lang="en-US" dirty="0" smtClean="0"/>
+              <a:t>2013</a:t>
             </a:r>
           </a:p>
           <a:p>
@@ -11073,24 +11278,8 @@
               <a:buChar char="§"/>
             </a:pPr>
             <a:r>
-              <a:rPr lang="en-US" dirty="0" smtClean="0"/>
-              <a:t>No </a:t>
-            </a:r>
-            <a:r>
-              <a:rPr lang="en-US" dirty="0" err="1" smtClean="0"/>
-              <a:t>JSHint</a:t>
-            </a:r>
-            <a:r>
-              <a:rPr lang="en-US" dirty="0" smtClean="0"/>
-              <a:t>/</a:t>
-            </a:r>
-            <a:r>
-              <a:rPr lang="en-US" dirty="0" err="1" smtClean="0"/>
-              <a:t>JSLint</a:t>
-            </a:r>
-            <a:r>
-              <a:rPr lang="en-US" dirty="0" smtClean="0"/>
-              <a:t> type tooling yet</a:t>
+              <a:rPr lang="en-US" dirty="0"/>
+              <a:t>Still in Beta (0.9.1.1 as of this presentation)</a:t>
             </a:r>
           </a:p>
           <a:p>
@@ -11099,8 +11288,24 @@
               <a:buChar char="§"/>
             </a:pPr>
             <a:r>
-              <a:rPr lang="en-US" dirty="0" smtClean="0"/>
-              <a:t>Limited tooling outside of Visual Studio</a:t>
+              <a:rPr lang="en-US" dirty="0"/>
+              <a:t>No </a:t>
+            </a:r>
+            <a:r>
+              <a:rPr lang="en-US" dirty="0" err="1"/>
+              <a:t>JSHint</a:t>
+            </a:r>
+            <a:r>
+              <a:rPr lang="en-US" dirty="0"/>
+              <a:t>/</a:t>
+            </a:r>
+            <a:r>
+              <a:rPr lang="en-US" dirty="0" err="1"/>
+              <a:t>JSLint</a:t>
+            </a:r>
+            <a:r>
+              <a:rPr lang="en-US" dirty="0"/>
+              <a:t> type tooling yet</a:t>
             </a:r>
           </a:p>
           <a:p>
@@ -11109,9 +11314,16 @@
               <a:buChar char="§"/>
             </a:pPr>
             <a:r>
-              <a:rPr lang="en-US" dirty="0" smtClean="0"/>
-              <a:t>Only Available in Visual Studio 2012 &amp; 2013</a:t>
-            </a:r>
+              <a:rPr lang="en-US" dirty="0"/>
+              <a:t>Limited tooling outside of Visual Studio</a:t>
+            </a:r>
+          </a:p>
+          <a:p>
+            <a:pPr>
+              <a:buFont typeface="Wingdings" panose="05000000000000000000" pitchFamily="2" charset="2"/>
+              <a:buChar char="§"/>
+            </a:pPr>
+            <a:endParaRPr lang="en-US" dirty="0" smtClean="0"/>
           </a:p>
           <a:p>
             <a:pPr>
@@ -11161,6 +11373,175 @@
           <a:prstGeom prst="rect">
             <a:avLst/>
           </a:prstGeom>
+        </p:spPr>
+      </p:pic>
+      <p:cxnSp>
+        <p:nvCxnSpPr>
+          <p:cNvPr id="5" name="Straight Connector 4"/>
+          <p:cNvCxnSpPr/>
+          <p:nvPr/>
+        </p:nvCxnSpPr>
+        <p:spPr>
+          <a:xfrm>
+            <a:off x="860156" y="2929180"/>
+            <a:ext cx="4602997" cy="0"/>
+          </a:xfrm>
+          <a:prstGeom prst="line">
+            <a:avLst/>
+          </a:prstGeom>
+          <a:ln>
+            <a:solidFill>
+              <a:schemeClr val="tx1"/>
+            </a:solidFill>
+          </a:ln>
+        </p:spPr>
+        <p:style>
+          <a:lnRef idx="1">
+            <a:schemeClr val="accent1"/>
+          </a:lnRef>
+          <a:fillRef idx="0">
+            <a:schemeClr val="accent1"/>
+          </a:fillRef>
+          <a:effectRef idx="0">
+            <a:schemeClr val="accent1"/>
+          </a:effectRef>
+          <a:fontRef idx="minor">
+            <a:schemeClr val="tx1"/>
+          </a:fontRef>
+        </p:style>
+      </p:cxnSp>
+      <p:cxnSp>
+        <p:nvCxnSpPr>
+          <p:cNvPr id="8" name="Straight Connector 7"/>
+          <p:cNvCxnSpPr/>
+          <p:nvPr/>
+        </p:nvCxnSpPr>
+        <p:spPr>
+          <a:xfrm>
+            <a:off x="860156" y="3373465"/>
+            <a:ext cx="3541363" cy="0"/>
+          </a:xfrm>
+          <a:prstGeom prst="line">
+            <a:avLst/>
+          </a:prstGeom>
+          <a:ln>
+            <a:solidFill>
+              <a:schemeClr val="tx1"/>
+            </a:solidFill>
+          </a:ln>
+        </p:spPr>
+        <p:style>
+          <a:lnRef idx="1">
+            <a:schemeClr val="accent1"/>
+          </a:lnRef>
+          <a:fillRef idx="0">
+            <a:schemeClr val="accent1"/>
+          </a:fillRef>
+          <a:effectRef idx="0">
+            <a:schemeClr val="accent1"/>
+          </a:effectRef>
+          <a:fontRef idx="minor">
+            <a:schemeClr val="tx1"/>
+          </a:fontRef>
+        </p:style>
+      </p:cxnSp>
+      <p:cxnSp>
+        <p:nvCxnSpPr>
+          <p:cNvPr id="11" name="Straight Connector 10"/>
+          <p:cNvCxnSpPr/>
+          <p:nvPr/>
+        </p:nvCxnSpPr>
+        <p:spPr>
+          <a:xfrm>
+            <a:off x="860155" y="3838414"/>
+            <a:ext cx="4169045" cy="0"/>
+          </a:xfrm>
+          <a:prstGeom prst="line">
+            <a:avLst/>
+          </a:prstGeom>
+          <a:ln>
+            <a:solidFill>
+              <a:schemeClr val="tx1"/>
+            </a:solidFill>
+          </a:ln>
+        </p:spPr>
+        <p:style>
+          <a:lnRef idx="1">
+            <a:schemeClr val="accent1"/>
+          </a:lnRef>
+          <a:fillRef idx="0">
+            <a:schemeClr val="accent1"/>
+          </a:fillRef>
+          <a:effectRef idx="0">
+            <a:schemeClr val="accent1"/>
+          </a:effectRef>
+          <a:fontRef idx="minor">
+            <a:schemeClr val="tx1"/>
+          </a:fontRef>
+        </p:style>
+      </p:cxnSp>
+      <p:pic>
+        <p:nvPicPr>
+          <p:cNvPr id="1026" name="Picture 2"/>
+          <p:cNvPicPr>
+            <a:picLocks noChangeAspect="1" noChangeArrowheads="1"/>
+          </p:cNvPicPr>
+          <p:nvPr/>
+        </p:nvPicPr>
+        <p:blipFill>
+          <a:blip r:embed="rId3">
+            <a:extLst>
+              <a:ext uri="{28A0092B-C50C-407E-A947-70E740481C1C}">
+                <a14:useLocalDpi xmlns:a14="http://schemas.microsoft.com/office/drawing/2010/main" val="0"/>
+              </a:ext>
+            </a:extLst>
+          </a:blip>
+          <a:srcRect/>
+          <a:stretch>
+            <a:fillRect/>
+          </a:stretch>
+        </p:blipFill>
+        <p:spPr bwMode="auto">
+          <a:xfrm>
+            <a:off x="5704192" y="2782914"/>
+            <a:ext cx="2752725" cy="2857500"/>
+          </a:xfrm>
+          <a:prstGeom prst="rect">
+            <a:avLst/>
+          </a:prstGeom>
+          <a:noFill/>
+          <a:ln>
+            <a:noFill/>
+          </a:ln>
+          <a:effectLst/>
+          <a:extLst>
+            <a:ext uri="{909E8E84-426E-40DD-AFC4-6F175D3DCCD1}">
+              <a14:hiddenFill xmlns:a14="http://schemas.microsoft.com/office/drawing/2010/main">
+                <a:solidFill>
+                  <a:schemeClr val="accent1"/>
+                </a:solidFill>
+              </a14:hiddenFill>
+            </a:ext>
+            <a:ext uri="{91240B29-F687-4F45-9708-019B960494DF}">
+              <a14:hiddenLine xmlns:a14="http://schemas.microsoft.com/office/drawing/2010/main" w="9525">
+                <a:solidFill>
+                  <a:schemeClr val="tx1"/>
+                </a:solidFill>
+                <a:miter lim="800000"/>
+                <a:headEnd/>
+                <a:tailEnd/>
+              </a14:hiddenLine>
+            </a:ext>
+            <a:ext uri="{AF507438-7753-43E0-B8FC-AC1667EBCBE1}">
+              <a14:hiddenEffects xmlns:a14="http://schemas.microsoft.com/office/drawing/2010/main">
+                <a:effectLst>
+                  <a:outerShdw dist="35921" dir="2700000" algn="ctr" rotWithShape="0">
+                    <a:schemeClr val="bg2"/>
+                  </a:outerShdw>
+                </a:effectLst>
+              </a14:hiddenEffects>
+            </a:ext>
+          </a:extLst>
         </p:spPr>
       </p:pic>
     </p:spTree>
@@ -11322,26 +11703,39 @@
                                   </p:childTnLst>
                                 </p:cTn>
                               </p:par>
-                            </p:childTnLst>
-                          </p:cTn>
-                        </p:par>
-                      </p:childTnLst>
-                    </p:cTn>
-                  </p:par>
-                  <p:par>
-                    <p:cTn id="15" fill="hold">
-                      <p:stCondLst>
-                        <p:cond delay="indefinite"/>
-                      </p:stCondLst>
-                      <p:childTnLst>
-                        <p:par>
-                          <p:cTn id="16" fill="hold">
-                            <p:stCondLst>
-                              <p:cond delay="0"/>
-                            </p:stCondLst>
-                            <p:childTnLst>
                               <p:par>
-                                <p:cTn id="17" presetID="1" presetClass="entr" presetSubtype="0" fill="hold" grpId="0" nodeType="clickEffect">
+                                <p:cTn id="15" presetID="1" presetClass="entr" presetSubtype="0" fill="hold" grpId="0" nodeType="withEffect">
+                                  <p:stCondLst>
+                                    <p:cond delay="0"/>
+                                  </p:stCondLst>
+                                  <p:childTnLst>
+                                    <p:set>
+                                      <p:cBhvr>
+                                        <p:cTn id="16" dur="1" fill="hold">
+                                          <p:stCondLst>
+                                            <p:cond delay="0"/>
+                                          </p:stCondLst>
+                                        </p:cTn>
+                                        <p:tgtEl>
+                                          <p:spTgt spid="3">
+                                            <p:txEl>
+                                              <p:pRg st="3" end="3"/>
+                                            </p:txEl>
+                                          </p:spTgt>
+                                        </p:tgtEl>
+                                        <p:attrNameLst>
+                                          <p:attrName>style.visibility</p:attrName>
+                                        </p:attrNameLst>
+                                      </p:cBhvr>
+                                      <p:to>
+                                        <p:strVal val="visible"/>
+                                      </p:to>
+                                    </p:set>
+                                  </p:childTnLst>
+                                </p:cTn>
+                              </p:par>
+                              <p:par>
+                                <p:cTn id="17" presetID="1" presetClass="entr" presetSubtype="0" fill="hold" grpId="0" nodeType="withEffect">
                                   <p:stCondLst>
                                     <p:cond delay="0"/>
                                   </p:stCondLst>
@@ -11356,7 +11750,7 @@
                                         <p:tgtEl>
                                           <p:spTgt spid="3">
                                             <p:txEl>
-                                              <p:pRg st="3" end="3"/>
+                                              <p:pRg st="4" end="4"/>
                                             </p:txEl>
                                           </p:spTgt>
                                         </p:tgtEl>
@@ -11390,7 +11784,7 @@
                             </p:stCondLst>
                             <p:childTnLst>
                               <p:par>
-                                <p:cTn id="21" presetID="1" presetClass="entr" presetSubtype="0" fill="hold" grpId="0" nodeType="clickEffect">
+                                <p:cTn id="21" presetID="1" presetClass="entr" presetSubtype="0" fill="hold" nodeType="clickEffect">
                                   <p:stCondLst>
                                     <p:cond delay="0"/>
                                   </p:stCondLst>
@@ -11403,11 +11797,61 @@
                                           </p:stCondLst>
                                         </p:cTn>
                                         <p:tgtEl>
-                                          <p:spTgt spid="3">
-                                            <p:txEl>
-                                              <p:pRg st="4" end="4"/>
-                                            </p:txEl>
-                                          </p:spTgt>
+                                          <p:spTgt spid="5"/>
+                                        </p:tgtEl>
+                                        <p:attrNameLst>
+                                          <p:attrName>style.visibility</p:attrName>
+                                        </p:attrNameLst>
+                                      </p:cBhvr>
+                                      <p:to>
+                                        <p:strVal val="visible"/>
+                                      </p:to>
+                                    </p:set>
+                                  </p:childTnLst>
+                                </p:cTn>
+                              </p:par>
+                              <p:par>
+                                <p:cTn id="23" presetID="1" presetClass="entr" presetSubtype="0" fill="hold" nodeType="withEffect">
+                                  <p:stCondLst>
+                                    <p:cond delay="0"/>
+                                  </p:stCondLst>
+                                  <p:childTnLst>
+                                    <p:set>
+                                      <p:cBhvr>
+                                        <p:cTn id="24" dur="1" fill="hold">
+                                          <p:stCondLst>
+                                            <p:cond delay="0"/>
+                                          </p:stCondLst>
+                                        </p:cTn>
+                                        <p:tgtEl>
+                                          <p:spTgt spid="8"/>
+                                        </p:tgtEl>
+                                        <p:attrNameLst>
+                                          <p:attrName>style.visibility</p:attrName>
+                                        </p:attrNameLst>
+                                      </p:cBhvr>
+                                      <p:to>
+                                        <p:strVal val="visible"/>
+                                      </p:to>
+                                    </p:set>
+                                  </p:childTnLst>
+                                </p:cTn>
+                              </p:par>
+                              <p:par>
+                                <p:cTn id="25" presetID="1" presetClass="entr" presetSubtype="0" fill="hold" nodeType="withEffect">
+                                  <p:stCondLst>
+                                    <p:cond delay="0"/>
+                                  </p:stCondLst>
+                                  <p:childTnLst>
+                                    <p:set>
+                                      <p:cBhvr>
+                                        <p:cTn id="26" dur="1" fill="hold">
+                                          <p:stCondLst>
+                                            <p:cond delay="0"/>
+                                          </p:stCondLst>
+                                        </p:cTn>
+                                        <p:tgtEl>
+                                          <p:spTgt spid="11"/>
                                         </p:tgtEl>
                                         <p:attrNameLst>
                                           <p:attrName>style.visibility</p:attrName>
@@ -11427,26 +11871,98 @@
                     </p:cTn>
                   </p:par>
                   <p:par>
-                    <p:cTn id="23" fill="hold">
+                    <p:cTn id="27" fill="hold">
                       <p:stCondLst>
                         <p:cond delay="indefinite"/>
                       </p:stCondLst>
                       <p:childTnLst>
                         <p:par>
-                          <p:cTn id="24" fill="hold">
+                          <p:cTn id="28" fill="hold">
                             <p:stCondLst>
                               <p:cond delay="0"/>
                             </p:stCondLst>
                             <p:childTnLst>
                               <p:par>
-                                <p:cTn id="25" presetID="1" presetClass="entr" presetSubtype="0" fill="hold" grpId="0" nodeType="clickEffect">
+                                <p:cTn id="29" presetID="1" presetClass="exit" presetSubtype="0" fill="hold" nodeType="clickEffect">
                                   <p:stCondLst>
                                     <p:cond delay="0"/>
                                   </p:stCondLst>
                                   <p:childTnLst>
                                     <p:set>
                                       <p:cBhvr>
-                                        <p:cTn id="26" dur="1" fill="hold">
+                                        <p:cTn id="30" dur="1" fill="hold">
+                                          <p:stCondLst>
+                                            <p:cond delay="0"/>
+                                          </p:stCondLst>
+                                        </p:cTn>
+                                        <p:tgtEl>
+                                          <p:spTgt spid="7"/>
+                                        </p:tgtEl>
+                                        <p:attrNameLst>
+                                          <p:attrName>style.visibility</p:attrName>
+                                        </p:attrNameLst>
+                                      </p:cBhvr>
+                                      <p:to>
+                                        <p:strVal val="hidden"/>
+                                      </p:to>
+                                    </p:set>
+                                  </p:childTnLst>
+                                </p:cTn>
+                              </p:par>
+                              <p:par>
+                                <p:cTn id="31" presetID="1" presetClass="entr" presetSubtype="0" fill="hold" nodeType="withEffect">
+                                  <p:stCondLst>
+                                    <p:cond delay="0"/>
+                                  </p:stCondLst>
+                                  <p:childTnLst>
+                                    <p:set>
+                                      <p:cBhvr>
+                                        <p:cTn id="32" dur="1" fill="hold">
+                                          <p:stCondLst>
+                                            <p:cond delay="0"/>
+                                          </p:stCondLst>
+                                        </p:cTn>
+                                        <p:tgtEl>
+                                          <p:spTgt spid="1026"/>
+                                        </p:tgtEl>
+                                        <p:attrNameLst>
+                                          <p:attrName>style.visibility</p:attrName>
+                                        </p:attrNameLst>
+                                      </p:cBhvr>
+                                      <p:to>
+                                        <p:strVal val="visible"/>
+                                      </p:to>
+                                    </p:set>
+                                  </p:childTnLst>
+                                </p:cTn>
+                              </p:par>
+                            </p:childTnLst>
+                          </p:cTn>
+                        </p:par>
+                      </p:childTnLst>
+                    </p:cTn>
+                  </p:par>
+                  <p:par>
+                    <p:cTn id="33" fill="hold">
+                      <p:stCondLst>
+                        <p:cond delay="indefinite"/>
+                      </p:stCondLst>
+                      <p:childTnLst>
+                        <p:par>
+                          <p:cTn id="34" fill="hold">
+                            <p:stCondLst>
+                              <p:cond delay="0"/>
+                            </p:stCondLst>
+                            <p:childTnLst>
+                              <p:par>
+                                <p:cTn id="35" presetID="1" presetClass="entr" presetSubtype="0" fill="hold" grpId="0" nodeType="clickEffect">
+                                  <p:stCondLst>
+                                    <p:cond delay="0"/>
+                                  </p:stCondLst>
+                                  <p:childTnLst>
+                                    <p:set>
+                                      <p:cBhvr>
+                                        <p:cTn id="36" dur="1" fill="hold">
                                           <p:stCondLst>
                                             <p:cond delay="0"/>
                                           </p:stCondLst>
@@ -11454,7 +11970,7 @@
                                         <p:tgtEl>
                                           <p:spTgt spid="3">
                                             <p:txEl>
-                                              <p:pRg st="6" end="6"/>
+                                              <p:pRg st="7" end="7"/>
                                             </p:txEl>
                                           </p:spTgt>
                                         </p:tgtEl>
@@ -11497,7 +12013,7 @@
       </p:par>
     </p:tnLst>
     <p:bldLst>
-      <p:bldP spid="3" grpId="0" build="p"/>
+      <p:bldP spid="3" grpId="0" uiExpand="1" build="p"/>
     </p:bldLst>
   </p:timing>
 </p:sld>
@@ -11897,7 +12413,7 @@
   <a:extraClrSchemeLst/>
   <a:extLst>
     <a:ext uri="{05A4C25C-085E-4340-85A3-A5531E510DB2}">
-      <thm15:themeFamily xmlns="" xmlns:thm15="http://schemas.microsoft.com/office/thememl/2012/main" name="Retrospect" id="{5F128B03-DCCA-4EEB-AB3B-CF2899314A46}" vid="{9CC26709-368C-4D72-9060-94E5B3FF3CD6}"/>
+      <thm15:themeFamily xmlns:thm15="http://schemas.microsoft.com/office/thememl/2012/main" xmlns="" name="Retrospect" id="{5F128B03-DCCA-4EEB-AB3B-CF2899314A46}" vid="{9CC26709-368C-4D72-9060-94E5B3FF3CD6}"/>
     </a:ext>
   </a:extLst>
 </a:theme>

</xml_diff>